<commit_message>
Continuing Issue 491 [Update storage entity diagram to include multiple instructors per course] Update Issue 491 Reverted to dataTransferClasses digarm to prevision state.
</commit_message>
<xml_diff>
--- a/doc/diagrams/dataTransferClasses.pptx
+++ b/doc/diagrams/dataTransferClasses.pptx
@@ -289,7 +289,7 @@
             <a:fld id="{1D8BD707-D9CF-40AE-B4C6-C98DA3205C09}" type="datetimeFigureOut">
               <a:rPr lang="en-US" smtClean="0"/>
               <a:pPr/>
-              <a:t>1/15/2013</a:t>
+              <a:t>12/1/2012</a:t>
             </a:fld>
             <a:endParaRPr lang="en-US"/>
           </a:p>
@@ -456,7 +456,7 @@
             <a:fld id="{1D8BD707-D9CF-40AE-B4C6-C98DA3205C09}" type="datetimeFigureOut">
               <a:rPr lang="en-US" smtClean="0"/>
               <a:pPr/>
-              <a:t>1/15/2013</a:t>
+              <a:t>12/1/2012</a:t>
             </a:fld>
             <a:endParaRPr lang="en-US"/>
           </a:p>
@@ -633,7 +633,7 @@
             <a:fld id="{1D8BD707-D9CF-40AE-B4C6-C98DA3205C09}" type="datetimeFigureOut">
               <a:rPr lang="en-US" smtClean="0"/>
               <a:pPr/>
-              <a:t>1/15/2013</a:t>
+              <a:t>12/1/2012</a:t>
             </a:fld>
             <a:endParaRPr lang="en-US"/>
           </a:p>
@@ -800,7 +800,7 @@
             <a:fld id="{1D8BD707-D9CF-40AE-B4C6-C98DA3205C09}" type="datetimeFigureOut">
               <a:rPr lang="en-US" smtClean="0"/>
               <a:pPr/>
-              <a:t>1/15/2013</a:t>
+              <a:t>12/1/2012</a:t>
             </a:fld>
             <a:endParaRPr lang="en-US"/>
           </a:p>
@@ -1043,7 +1043,7 @@
             <a:fld id="{1D8BD707-D9CF-40AE-B4C6-C98DA3205C09}" type="datetimeFigureOut">
               <a:rPr lang="en-US" smtClean="0"/>
               <a:pPr/>
-              <a:t>1/15/2013</a:t>
+              <a:t>12/1/2012</a:t>
             </a:fld>
             <a:endParaRPr lang="en-US"/>
           </a:p>
@@ -1328,7 +1328,7 @@
             <a:fld id="{1D8BD707-D9CF-40AE-B4C6-C98DA3205C09}" type="datetimeFigureOut">
               <a:rPr lang="en-US" smtClean="0"/>
               <a:pPr/>
-              <a:t>1/15/2013</a:t>
+              <a:t>12/1/2012</a:t>
             </a:fld>
             <a:endParaRPr lang="en-US"/>
           </a:p>
@@ -1747,7 +1747,7 @@
             <a:fld id="{1D8BD707-D9CF-40AE-B4C6-C98DA3205C09}" type="datetimeFigureOut">
               <a:rPr lang="en-US" smtClean="0"/>
               <a:pPr/>
-              <a:t>1/15/2013</a:t>
+              <a:t>12/1/2012</a:t>
             </a:fld>
             <a:endParaRPr lang="en-US"/>
           </a:p>
@@ -1862,7 +1862,7 @@
             <a:fld id="{1D8BD707-D9CF-40AE-B4C6-C98DA3205C09}" type="datetimeFigureOut">
               <a:rPr lang="en-US" smtClean="0"/>
               <a:pPr/>
-              <a:t>1/15/2013</a:t>
+              <a:t>12/1/2012</a:t>
             </a:fld>
             <a:endParaRPr lang="en-US"/>
           </a:p>
@@ -1954,7 +1954,7 @@
             <a:fld id="{1D8BD707-D9CF-40AE-B4C6-C98DA3205C09}" type="datetimeFigureOut">
               <a:rPr lang="en-US" smtClean="0"/>
               <a:pPr/>
-              <a:t>1/15/2013</a:t>
+              <a:t>12/1/2012</a:t>
             </a:fld>
             <a:endParaRPr lang="en-US"/>
           </a:p>
@@ -2228,7 +2228,7 @@
             <a:fld id="{1D8BD707-D9CF-40AE-B4C6-C98DA3205C09}" type="datetimeFigureOut">
               <a:rPr lang="en-US" smtClean="0"/>
               <a:pPr/>
-              <a:t>1/15/2013</a:t>
+              <a:t>12/1/2012</a:t>
             </a:fld>
             <a:endParaRPr lang="en-US"/>
           </a:p>
@@ -2478,7 +2478,7 @@
             <a:fld id="{1D8BD707-D9CF-40AE-B4C6-C98DA3205C09}" type="datetimeFigureOut">
               <a:rPr lang="en-US" smtClean="0"/>
               <a:pPr/>
-              <a:t>1/15/2013</a:t>
+              <a:t>12/1/2012</a:t>
             </a:fld>
             <a:endParaRPr lang="en-US"/>
           </a:p>
@@ -2688,7 +2688,7 @@
             <a:fld id="{1D8BD707-D9CF-40AE-B4C6-C98DA3205C09}" type="datetimeFigureOut">
               <a:rPr lang="en-US" smtClean="0"/>
               <a:pPr/>
-              <a:t>1/15/2013</a:t>
+              <a:t>12/1/2012</a:t>
             </a:fld>
             <a:endParaRPr lang="en-US"/>
           </a:p>
@@ -3061,14 +3061,14 @@
       </p:grpSpPr>
       <p:sp>
         <p:nvSpPr>
-          <p:cNvPr id="256" name="Rectangle 255"/>
+          <p:cNvPr id="255" name="Rectangle 254"/>
           <p:cNvSpPr/>
           <p:nvPr/>
         </p:nvSpPr>
         <p:spPr>
           <a:xfrm>
-            <a:off x="990600" y="1094889"/>
-            <a:ext cx="1219199" cy="272886"/>
+            <a:off x="963874" y="1720521"/>
+            <a:ext cx="1550726" cy="361770"/>
           </a:xfrm>
           <a:prstGeom prst="rect">
             <a:avLst/>
@@ -3096,10 +3096,186 @@
           <a:p>
             <a:pPr algn="ctr"/>
             <a:r>
-              <a:rPr lang="en-US" sz="1200" b="1" dirty="0" err="1" smtClean="0"/>
-              <a:t>AccountData</a:t>
-            </a:r>
-            <a:endParaRPr lang="en-SG" sz="1200" b="1" dirty="0"/>
+              <a:rPr lang="en-US" sz="1600" b="1" dirty="0" err="1" smtClean="0"/>
+              <a:t>StudentData</a:t>
+            </a:r>
+            <a:endParaRPr lang="en-SG" sz="1600" b="1" dirty="0"/>
+          </a:p>
+        </p:txBody>
+      </p:sp>
+      <p:sp>
+        <p:nvSpPr>
+          <p:cNvPr id="256" name="Rectangle 255"/>
+          <p:cNvSpPr/>
+          <p:nvPr/>
+        </p:nvSpPr>
+        <p:spPr>
+          <a:xfrm>
+            <a:off x="963874" y="1265237"/>
+            <a:ext cx="1550726" cy="361770"/>
+          </a:xfrm>
+          <a:prstGeom prst="rect">
+            <a:avLst/>
+          </a:prstGeom>
+        </p:spPr>
+        <p:style>
+          <a:lnRef idx="2">
+            <a:schemeClr val="accent6">
+              <a:shade val="50000"/>
+            </a:schemeClr>
+          </a:lnRef>
+          <a:fillRef idx="1">
+            <a:schemeClr val="accent6"/>
+          </a:fillRef>
+          <a:effectRef idx="0">
+            <a:schemeClr val="accent6"/>
+          </a:effectRef>
+          <a:fontRef idx="minor">
+            <a:schemeClr val="lt1"/>
+          </a:fontRef>
+        </p:style>
+        <p:txBody>
+          <a:bodyPr rtlCol="0" anchor="ctr"/>
+          <a:lstStyle/>
+          <a:p>
+            <a:pPr algn="ctr"/>
+            <a:r>
+              <a:rPr lang="en-US" sz="1600" b="1" dirty="0" err="1" smtClean="0"/>
+              <a:t>InstructorData</a:t>
+            </a:r>
+            <a:endParaRPr lang="en-SG" sz="1600" b="1" dirty="0"/>
+          </a:p>
+        </p:txBody>
+      </p:sp>
+      <p:sp>
+        <p:nvSpPr>
+          <p:cNvPr id="257" name="Rectangle 256"/>
+          <p:cNvSpPr/>
+          <p:nvPr/>
+        </p:nvSpPr>
+        <p:spPr>
+          <a:xfrm>
+            <a:off x="963874" y="2631089"/>
+            <a:ext cx="1550726" cy="361770"/>
+          </a:xfrm>
+          <a:prstGeom prst="rect">
+            <a:avLst/>
+          </a:prstGeom>
+        </p:spPr>
+        <p:style>
+          <a:lnRef idx="2">
+            <a:schemeClr val="accent6">
+              <a:shade val="50000"/>
+            </a:schemeClr>
+          </a:lnRef>
+          <a:fillRef idx="1">
+            <a:schemeClr val="accent6"/>
+          </a:fillRef>
+          <a:effectRef idx="0">
+            <a:schemeClr val="accent6"/>
+          </a:effectRef>
+          <a:fontRef idx="minor">
+            <a:schemeClr val="lt1"/>
+          </a:fontRef>
+        </p:style>
+        <p:txBody>
+          <a:bodyPr rtlCol="0" anchor="ctr"/>
+          <a:lstStyle/>
+          <a:p>
+            <a:pPr algn="ctr"/>
+            <a:r>
+              <a:rPr lang="en-US" sz="1600" b="1" dirty="0" err="1" smtClean="0"/>
+              <a:t>EvaluationData</a:t>
+            </a:r>
+            <a:endParaRPr lang="en-SG" sz="1600" b="1" dirty="0"/>
+          </a:p>
+        </p:txBody>
+      </p:sp>
+      <p:sp>
+        <p:nvSpPr>
+          <p:cNvPr id="258" name="Rectangle 257"/>
+          <p:cNvSpPr/>
+          <p:nvPr/>
+        </p:nvSpPr>
+        <p:spPr>
+          <a:xfrm>
+            <a:off x="963874" y="3086372"/>
+            <a:ext cx="1550726" cy="361770"/>
+          </a:xfrm>
+          <a:prstGeom prst="rect">
+            <a:avLst/>
+          </a:prstGeom>
+        </p:spPr>
+        <p:style>
+          <a:lnRef idx="2">
+            <a:schemeClr val="accent6">
+              <a:shade val="50000"/>
+            </a:schemeClr>
+          </a:lnRef>
+          <a:fillRef idx="1">
+            <a:schemeClr val="accent6"/>
+          </a:fillRef>
+          <a:effectRef idx="0">
+            <a:schemeClr val="accent6"/>
+          </a:effectRef>
+          <a:fontRef idx="minor">
+            <a:schemeClr val="lt1"/>
+          </a:fontRef>
+        </p:style>
+        <p:txBody>
+          <a:bodyPr rtlCol="0" anchor="ctr"/>
+          <a:lstStyle/>
+          <a:p>
+            <a:pPr algn="ctr"/>
+            <a:r>
+              <a:rPr lang="en-US" sz="1600" b="1" dirty="0" err="1" smtClean="0"/>
+              <a:t>SubmissionData</a:t>
+            </a:r>
+            <a:endParaRPr lang="en-SG" sz="1600" b="1" dirty="0"/>
+          </a:p>
+        </p:txBody>
+      </p:sp>
+      <p:sp>
+        <p:nvSpPr>
+          <p:cNvPr id="259" name="Rectangle 258"/>
+          <p:cNvSpPr/>
+          <p:nvPr/>
+        </p:nvSpPr>
+        <p:spPr>
+          <a:xfrm>
+            <a:off x="963874" y="2175805"/>
+            <a:ext cx="1550726" cy="361770"/>
+          </a:xfrm>
+          <a:prstGeom prst="rect">
+            <a:avLst/>
+          </a:prstGeom>
+        </p:spPr>
+        <p:style>
+          <a:lnRef idx="2">
+            <a:schemeClr val="accent6">
+              <a:shade val="50000"/>
+            </a:schemeClr>
+          </a:lnRef>
+          <a:fillRef idx="1">
+            <a:schemeClr val="accent6"/>
+          </a:fillRef>
+          <a:effectRef idx="0">
+            <a:schemeClr val="accent6"/>
+          </a:effectRef>
+          <a:fontRef idx="minor">
+            <a:schemeClr val="lt1"/>
+          </a:fontRef>
+        </p:style>
+        <p:txBody>
+          <a:bodyPr rtlCol="0" anchor="ctr"/>
+          <a:lstStyle/>
+          <a:p>
+            <a:pPr algn="ctr"/>
+            <a:r>
+              <a:rPr lang="en-US" sz="1600" b="1" dirty="0" err="1" smtClean="0"/>
+              <a:t>CourseData</a:t>
+            </a:r>
+            <a:endParaRPr lang="en-SG" sz="1600" b="1" dirty="0"/>
           </a:p>
         </p:txBody>
       </p:sp>
@@ -3111,8 +3287,8 @@
         </p:nvSpPr>
         <p:spPr>
           <a:xfrm>
-            <a:off x="2729842" y="1126497"/>
-            <a:ext cx="1398412" cy="331958"/>
+            <a:off x="3505200" y="1121802"/>
+            <a:ext cx="1524000" cy="361770"/>
           </a:xfrm>
           <a:prstGeom prst="rect">
             <a:avLst/>
@@ -3140,10 +3316,10 @@
           <a:p>
             <a:pPr algn="ctr"/>
             <a:r>
-              <a:rPr lang="en-US" sz="1200" b="1" dirty="0" err="1" smtClean="0"/>
+              <a:rPr lang="en-US" sz="1600" b="1" dirty="0" err="1" smtClean="0"/>
               <a:t>TeamData</a:t>
             </a:r>
-            <a:endParaRPr lang="en-SG" sz="1200" b="1" dirty="0"/>
+            <a:endParaRPr lang="en-SG" sz="1600" b="1" dirty="0"/>
           </a:p>
         </p:txBody>
       </p:sp>
@@ -3155,8 +3331,8 @@
         </p:nvSpPr>
         <p:spPr>
           <a:xfrm>
-            <a:off x="3644242" y="2360447"/>
-            <a:ext cx="1398412" cy="331958"/>
+            <a:off x="4419600" y="2355752"/>
+            <a:ext cx="1524000" cy="361770"/>
           </a:xfrm>
           <a:prstGeom prst="rect">
             <a:avLst/>
@@ -3184,10 +3360,10 @@
           <a:p>
             <a:pPr algn="ctr"/>
             <a:r>
-              <a:rPr lang="en-US" sz="1200" b="1" dirty="0" err="1" smtClean="0"/>
+              <a:rPr lang="en-US" sz="1600" b="1" dirty="0" err="1" smtClean="0"/>
               <a:t>EvalResultData</a:t>
             </a:r>
-            <a:endParaRPr lang="en-SG" sz="1200" b="1" dirty="0"/>
+            <a:endParaRPr lang="en-SG" sz="1600" b="1" dirty="0"/>
           </a:p>
         </p:txBody>
       </p:sp>
@@ -3289,8 +3465,46 @@
         </p:nvCxnSpPr>
         <p:spPr>
           <a:xfrm rot="16200000" flipH="1">
-            <a:off x="702753" y="943484"/>
-            <a:ext cx="194695" cy="381000"/>
+            <a:off x="581995" y="1064242"/>
+            <a:ext cx="409485" cy="354274"/>
+          </a:xfrm>
+          <a:prstGeom prst="bentConnector2">
+            <a:avLst/>
+          </a:prstGeom>
+          <a:ln>
+            <a:tailEnd type="arrow"/>
+          </a:ln>
+        </p:spPr>
+        <p:style>
+          <a:lnRef idx="2">
+            <a:schemeClr val="accent5">
+              <a:shade val="50000"/>
+            </a:schemeClr>
+          </a:lnRef>
+          <a:fillRef idx="1">
+            <a:schemeClr val="accent5"/>
+          </a:fillRef>
+          <a:effectRef idx="0">
+            <a:schemeClr val="accent5"/>
+          </a:effectRef>
+          <a:fontRef idx="minor">
+            <a:schemeClr val="lt1"/>
+          </a:fontRef>
+        </p:style>
+      </p:cxnSp>
+      <p:cxnSp>
+        <p:nvCxnSpPr>
+          <p:cNvPr id="265" name="Elbow Connector 187"/>
+          <p:cNvCxnSpPr>
+            <a:stCxn id="263" idx="3"/>
+            <a:endCxn id="255" idx="1"/>
+          </p:cNvCxnSpPr>
+          <p:nvPr/>
+        </p:nvCxnSpPr>
+        <p:spPr>
+          <a:xfrm rot="16200000" flipH="1">
+            <a:off x="354353" y="1291884"/>
+            <a:ext cx="864769" cy="354274"/>
           </a:xfrm>
           <a:prstGeom prst="bentConnector2">
             <a:avLst/>
@@ -3319,1907 +3533,19 @@
       <p:cxnSp>
         <p:nvCxnSpPr>
           <p:cNvPr id="266" name="Elbow Connector 190"/>
-          <p:cNvCxnSpPr/>
-          <p:nvPr/>
-        </p:nvCxnSpPr>
-        <p:spPr>
-          <a:xfrm flipV="1">
-            <a:off x="612755" y="2126058"/>
-            <a:ext cx="351120" cy="3"/>
-          </a:xfrm>
-          <a:prstGeom prst="bentConnector3">
-            <a:avLst>
-              <a:gd name="adj1" fmla="val 50000"/>
-            </a:avLst>
-          </a:prstGeom>
-          <a:ln>
-            <a:tailEnd type="arrow"/>
-          </a:ln>
-        </p:spPr>
-        <p:style>
-          <a:lnRef idx="2">
-            <a:schemeClr val="accent5">
-              <a:shade val="50000"/>
-            </a:schemeClr>
-          </a:lnRef>
-          <a:fillRef idx="1">
-            <a:schemeClr val="accent5"/>
-          </a:fillRef>
-          <a:effectRef idx="0">
-            <a:schemeClr val="accent5"/>
-          </a:effectRef>
-          <a:fontRef idx="minor">
-            <a:schemeClr val="lt1"/>
-          </a:fontRef>
-        </p:style>
-      </p:cxnSp>
-      <p:sp>
-        <p:nvSpPr>
-          <p:cNvPr id="269" name="TextBox 268"/>
-          <p:cNvSpPr txBox="1"/>
-          <p:nvPr/>
-        </p:nvSpPr>
-        <p:spPr>
-          <a:xfrm>
-            <a:off x="789892" y="949318"/>
-            <a:ext cx="172435" cy="369332"/>
-          </a:xfrm>
-          <a:prstGeom prst="rect">
-            <a:avLst/>
-          </a:prstGeom>
-          <a:noFill/>
-        </p:spPr>
-        <p:txBody>
-          <a:bodyPr wrap="square" rtlCol="0">
-            <a:spAutoFit/>
-          </a:bodyPr>
-          <a:lstStyle/>
-          <a:p>
-            <a:r>
-              <a:rPr lang="en-US" dirty="0" smtClean="0">
-                <a:solidFill>
-                  <a:schemeClr val="accent5">
-                    <a:lumMod val="75000"/>
-                  </a:schemeClr>
-                </a:solidFill>
-              </a:rPr>
-              <a:t>*</a:t>
-            </a:r>
-            <a:endParaRPr lang="en-US" dirty="0">
-              <a:solidFill>
-                <a:schemeClr val="accent5">
-                  <a:lumMod val="75000"/>
-                </a:schemeClr>
-              </a:solidFill>
-            </a:endParaRPr>
-          </a:p>
-        </p:txBody>
-      </p:sp>
-      <p:sp>
-        <p:nvSpPr>
-          <p:cNvPr id="274" name="Rectangle 273"/>
-          <p:cNvSpPr/>
-          <p:nvPr/>
-        </p:nvSpPr>
-        <p:spPr>
-          <a:xfrm>
-            <a:off x="2348842" y="507932"/>
-            <a:ext cx="1422935" cy="331958"/>
-          </a:xfrm>
-          <a:prstGeom prst="rect">
-            <a:avLst/>
-          </a:prstGeom>
-        </p:spPr>
-        <p:style>
-          <a:lnRef idx="2">
-            <a:schemeClr val="accent6">
-              <a:shade val="50000"/>
-            </a:schemeClr>
-          </a:lnRef>
-          <a:fillRef idx="1">
-            <a:schemeClr val="accent6"/>
-          </a:fillRef>
-          <a:effectRef idx="0">
-            <a:schemeClr val="accent6"/>
-          </a:effectRef>
-          <a:fontRef idx="minor">
-            <a:schemeClr val="lt1"/>
-          </a:fontRef>
-        </p:style>
-        <p:txBody>
-          <a:bodyPr rtlCol="0" anchor="ctr"/>
-          <a:lstStyle/>
-          <a:p>
-            <a:pPr algn="ctr"/>
-            <a:r>
-              <a:rPr lang="en-US" sz="1200" b="1" dirty="0" err="1" smtClean="0"/>
-              <a:t>EvaluationData</a:t>
-            </a:r>
-            <a:endParaRPr lang="en-SG" sz="1200" b="1" dirty="0"/>
-          </a:p>
-        </p:txBody>
-      </p:sp>
-      <p:sp>
-        <p:nvSpPr>
-          <p:cNvPr id="275" name="Flowchart: Decision 274"/>
-          <p:cNvSpPr/>
-          <p:nvPr/>
-        </p:nvSpPr>
-        <p:spPr>
-          <a:xfrm rot="5400000">
-            <a:off x="2431321" y="864316"/>
-            <a:ext cx="139842" cy="139842"/>
-          </a:xfrm>
-          <a:prstGeom prst="flowChartDecision">
-            <a:avLst/>
-          </a:prstGeom>
-          <a:solidFill>
-            <a:schemeClr val="bg1"/>
-          </a:solidFill>
-        </p:spPr>
-        <p:style>
-          <a:lnRef idx="2">
-            <a:schemeClr val="accent5">
-              <a:shade val="50000"/>
-            </a:schemeClr>
-          </a:lnRef>
-          <a:fillRef idx="1">
-            <a:schemeClr val="accent5"/>
-          </a:fillRef>
-          <a:effectRef idx="0">
-            <a:schemeClr val="accent5"/>
-          </a:effectRef>
-          <a:fontRef idx="minor">
-            <a:schemeClr val="lt1"/>
-          </a:fontRef>
-        </p:style>
-        <p:txBody>
-          <a:bodyPr rtlCol="0" anchor="ctr"/>
-          <a:lstStyle/>
-          <a:p>
-            <a:pPr algn="ctr"/>
-            <a:endParaRPr lang="en-US"/>
-          </a:p>
-        </p:txBody>
-      </p:sp>
-      <p:cxnSp>
-        <p:nvCxnSpPr>
-          <p:cNvPr id="276" name="Elbow Connector 186"/>
           <p:cNvCxnSpPr>
-            <a:stCxn id="275" idx="3"/>
-            <a:endCxn id="260" idx="1"/>
+            <a:stCxn id="263" idx="3"/>
+            <a:endCxn id="259" idx="1"/>
           </p:cNvCxnSpPr>
           <p:nvPr/>
         </p:nvCxnSpPr>
         <p:spPr>
           <a:xfrm rot="16200000" flipH="1">
-            <a:off x="2471383" y="1034017"/>
-            <a:ext cx="288318" cy="228600"/>
+            <a:off x="126711" y="1519526"/>
+            <a:ext cx="1320053" cy="354274"/>
           </a:xfrm>
           <a:prstGeom prst="bentConnector2">
             <a:avLst/>
-          </a:prstGeom>
-          <a:ln>
-            <a:tailEnd type="arrow"/>
-          </a:ln>
-        </p:spPr>
-        <p:style>
-          <a:lnRef idx="2">
-            <a:schemeClr val="accent5">
-              <a:shade val="50000"/>
-            </a:schemeClr>
-          </a:lnRef>
-          <a:fillRef idx="1">
-            <a:schemeClr val="accent5"/>
-          </a:fillRef>
-          <a:effectRef idx="0">
-            <a:schemeClr val="accent5"/>
-          </a:effectRef>
-          <a:fontRef idx="minor">
-            <a:schemeClr val="lt1"/>
-          </a:fontRef>
-        </p:style>
-      </p:cxnSp>
-      <p:sp>
-        <p:nvSpPr>
-          <p:cNvPr id="277" name="TextBox 276"/>
-          <p:cNvSpPr txBox="1"/>
-          <p:nvPr/>
-        </p:nvSpPr>
-        <p:spPr>
-          <a:xfrm>
-            <a:off x="2501242" y="1041331"/>
-            <a:ext cx="209762" cy="369332"/>
-          </a:xfrm>
-          <a:prstGeom prst="rect">
-            <a:avLst/>
-          </a:prstGeom>
-          <a:noFill/>
-        </p:spPr>
-        <p:txBody>
-          <a:bodyPr wrap="square" rtlCol="0">
-            <a:spAutoFit/>
-          </a:bodyPr>
-          <a:lstStyle/>
-          <a:p>
-            <a:r>
-              <a:rPr lang="en-US" dirty="0" smtClean="0">
-                <a:solidFill>
-                  <a:schemeClr val="accent5">
-                    <a:lumMod val="75000"/>
-                  </a:schemeClr>
-                </a:solidFill>
-              </a:rPr>
-              <a:t>*</a:t>
-            </a:r>
-            <a:endParaRPr lang="en-US" dirty="0">
-              <a:solidFill>
-                <a:schemeClr val="accent5">
-                  <a:lumMod val="75000"/>
-                </a:schemeClr>
-              </a:solidFill>
-            </a:endParaRPr>
-          </a:p>
-        </p:txBody>
-      </p:sp>
-      <p:sp>
-        <p:nvSpPr>
-          <p:cNvPr id="278" name="Rectangle 277"/>
-          <p:cNvSpPr/>
-          <p:nvPr/>
-        </p:nvSpPr>
-        <p:spPr>
-          <a:xfrm>
-            <a:off x="3110842" y="1764292"/>
-            <a:ext cx="1422935" cy="331958"/>
-          </a:xfrm>
-          <a:prstGeom prst="rect">
-            <a:avLst/>
-          </a:prstGeom>
-        </p:spPr>
-        <p:style>
-          <a:lnRef idx="2">
-            <a:schemeClr val="accent6">
-              <a:shade val="50000"/>
-            </a:schemeClr>
-          </a:lnRef>
-          <a:fillRef idx="1">
-            <a:schemeClr val="accent6"/>
-          </a:fillRef>
-          <a:effectRef idx="0">
-            <a:schemeClr val="accent6"/>
-          </a:effectRef>
-          <a:fontRef idx="minor">
-            <a:schemeClr val="lt1"/>
-          </a:fontRef>
-        </p:style>
-        <p:txBody>
-          <a:bodyPr rtlCol="0" anchor="ctr"/>
-          <a:lstStyle/>
-          <a:p>
-            <a:pPr algn="ctr"/>
-            <a:r>
-              <a:rPr lang="en-US" sz="1200" b="1" dirty="0" err="1" smtClean="0"/>
-              <a:t>StudentData</a:t>
-            </a:r>
-            <a:endParaRPr lang="en-SG" sz="1200" b="1" dirty="0"/>
-          </a:p>
-        </p:txBody>
-      </p:sp>
-      <p:sp>
-        <p:nvSpPr>
-          <p:cNvPr id="279" name="Flowchart: Decision 278"/>
-          <p:cNvSpPr/>
-          <p:nvPr/>
-        </p:nvSpPr>
-        <p:spPr>
-          <a:xfrm rot="5400000">
-            <a:off x="2806036" y="1479740"/>
-            <a:ext cx="139842" cy="139842"/>
-          </a:xfrm>
-          <a:prstGeom prst="flowChartDecision">
-            <a:avLst/>
-          </a:prstGeom>
-          <a:solidFill>
-            <a:schemeClr val="bg1"/>
-          </a:solidFill>
-        </p:spPr>
-        <p:style>
-          <a:lnRef idx="2">
-            <a:schemeClr val="accent5">
-              <a:shade val="50000"/>
-            </a:schemeClr>
-          </a:lnRef>
-          <a:fillRef idx="1">
-            <a:schemeClr val="accent5"/>
-          </a:fillRef>
-          <a:effectRef idx="0">
-            <a:schemeClr val="accent5"/>
-          </a:effectRef>
-          <a:fontRef idx="minor">
-            <a:schemeClr val="lt1"/>
-          </a:fontRef>
-        </p:style>
-        <p:txBody>
-          <a:bodyPr rtlCol="0" anchor="ctr"/>
-          <a:lstStyle/>
-          <a:p>
-            <a:pPr algn="ctr"/>
-            <a:endParaRPr lang="en-US"/>
-          </a:p>
-        </p:txBody>
-      </p:sp>
-      <p:cxnSp>
-        <p:nvCxnSpPr>
-          <p:cNvPr id="280" name="Elbow Connector 186"/>
-          <p:cNvCxnSpPr>
-            <a:stCxn id="279" idx="3"/>
-            <a:endCxn id="278" idx="1"/>
-          </p:cNvCxnSpPr>
-          <p:nvPr/>
-        </p:nvCxnSpPr>
-        <p:spPr>
-          <a:xfrm rot="16200000" flipH="1">
-            <a:off x="2838055" y="1657483"/>
-            <a:ext cx="310689" cy="234885"/>
-          </a:xfrm>
-          <a:prstGeom prst="bentConnector2">
-            <a:avLst/>
-          </a:prstGeom>
-          <a:ln>
-            <a:tailEnd type="arrow"/>
-          </a:ln>
-        </p:spPr>
-        <p:style>
-          <a:lnRef idx="2">
-            <a:schemeClr val="accent5">
-              <a:shade val="50000"/>
-            </a:schemeClr>
-          </a:lnRef>
-          <a:fillRef idx="1">
-            <a:schemeClr val="accent5"/>
-          </a:fillRef>
-          <a:effectRef idx="0">
-            <a:schemeClr val="accent5"/>
-          </a:effectRef>
-          <a:fontRef idx="minor">
-            <a:schemeClr val="lt1"/>
-          </a:fontRef>
-        </p:style>
-      </p:cxnSp>
-      <p:sp>
-        <p:nvSpPr>
-          <p:cNvPr id="281" name="TextBox 280"/>
-          <p:cNvSpPr txBox="1"/>
-          <p:nvPr/>
-        </p:nvSpPr>
-        <p:spPr>
-          <a:xfrm>
-            <a:off x="2882241" y="1659896"/>
-            <a:ext cx="209762" cy="369332"/>
-          </a:xfrm>
-          <a:prstGeom prst="rect">
-            <a:avLst/>
-          </a:prstGeom>
-          <a:noFill/>
-        </p:spPr>
-        <p:txBody>
-          <a:bodyPr wrap="square" rtlCol="0">
-            <a:spAutoFit/>
-          </a:bodyPr>
-          <a:lstStyle/>
-          <a:p>
-            <a:r>
-              <a:rPr lang="en-US" dirty="0" smtClean="0">
-                <a:solidFill>
-                  <a:schemeClr val="accent5">
-                    <a:lumMod val="75000"/>
-                  </a:schemeClr>
-                </a:solidFill>
-              </a:rPr>
-              <a:t>*</a:t>
-            </a:r>
-            <a:endParaRPr lang="en-US" dirty="0">
-              <a:solidFill>
-                <a:schemeClr val="accent5">
-                  <a:lumMod val="75000"/>
-                </a:schemeClr>
-              </a:solidFill>
-            </a:endParaRPr>
-          </a:p>
-        </p:txBody>
-      </p:sp>
-      <p:sp>
-        <p:nvSpPr>
-          <p:cNvPr id="282" name="Flowchart: Decision 281"/>
-          <p:cNvSpPr/>
-          <p:nvPr/>
-        </p:nvSpPr>
-        <p:spPr>
-          <a:xfrm rot="5400000">
-            <a:off x="3263242" y="2126061"/>
-            <a:ext cx="139842" cy="139842"/>
-          </a:xfrm>
-          <a:prstGeom prst="flowChartDecision">
-            <a:avLst/>
-          </a:prstGeom>
-          <a:solidFill>
-            <a:schemeClr val="bg1"/>
-          </a:solidFill>
-        </p:spPr>
-        <p:style>
-          <a:lnRef idx="2">
-            <a:schemeClr val="accent5">
-              <a:shade val="50000"/>
-            </a:schemeClr>
-          </a:lnRef>
-          <a:fillRef idx="1">
-            <a:schemeClr val="accent5"/>
-          </a:fillRef>
-          <a:effectRef idx="0">
-            <a:schemeClr val="accent5"/>
-          </a:effectRef>
-          <a:fontRef idx="minor">
-            <a:schemeClr val="lt1"/>
-          </a:fontRef>
-        </p:style>
-        <p:txBody>
-          <a:bodyPr rtlCol="0" anchor="ctr"/>
-          <a:lstStyle/>
-          <a:p>
-            <a:pPr algn="ctr"/>
-            <a:endParaRPr lang="en-US"/>
-          </a:p>
-        </p:txBody>
-      </p:sp>
-      <p:cxnSp>
-        <p:nvCxnSpPr>
-          <p:cNvPr id="283" name="Elbow Connector 186"/>
-          <p:cNvCxnSpPr>
-            <a:stCxn id="282" idx="3"/>
-            <a:endCxn id="261" idx="1"/>
-          </p:cNvCxnSpPr>
-          <p:nvPr/>
-        </p:nvCxnSpPr>
-        <p:spPr>
-          <a:xfrm rot="16200000" flipH="1">
-            <a:off x="3358441" y="2240624"/>
-            <a:ext cx="260523" cy="311079"/>
-          </a:xfrm>
-          <a:prstGeom prst="bentConnector2">
-            <a:avLst/>
-          </a:prstGeom>
-          <a:ln>
-            <a:tailEnd type="arrow"/>
-          </a:ln>
-        </p:spPr>
-        <p:style>
-          <a:lnRef idx="2">
-            <a:schemeClr val="accent5">
-              <a:shade val="50000"/>
-            </a:schemeClr>
-          </a:lnRef>
-          <a:fillRef idx="1">
-            <a:schemeClr val="accent5"/>
-          </a:fillRef>
-          <a:effectRef idx="0">
-            <a:schemeClr val="accent5"/>
-          </a:effectRef>
-          <a:fontRef idx="minor">
-            <a:schemeClr val="lt1"/>
-          </a:fontRef>
-        </p:style>
-      </p:cxnSp>
-      <p:sp>
-        <p:nvSpPr>
-          <p:cNvPr id="284" name="TextBox 283"/>
-          <p:cNvSpPr txBox="1"/>
-          <p:nvPr/>
-        </p:nvSpPr>
-        <p:spPr>
-          <a:xfrm>
-            <a:off x="3375307" y="2278461"/>
-            <a:ext cx="209762" cy="369332"/>
-          </a:xfrm>
-          <a:prstGeom prst="rect">
-            <a:avLst/>
-          </a:prstGeom>
-          <a:noFill/>
-        </p:spPr>
-        <p:txBody>
-          <a:bodyPr wrap="square" rtlCol="0">
-            <a:spAutoFit/>
-          </a:bodyPr>
-          <a:lstStyle/>
-          <a:p>
-            <a:r>
-              <a:rPr lang="en-US" dirty="0" smtClean="0">
-                <a:solidFill>
-                  <a:schemeClr val="accent5">
-                    <a:lumMod val="75000"/>
-                  </a:schemeClr>
-                </a:solidFill>
-              </a:rPr>
-              <a:t>*</a:t>
-            </a:r>
-            <a:endParaRPr lang="en-US" dirty="0">
-              <a:solidFill>
-                <a:schemeClr val="accent5">
-                  <a:lumMod val="75000"/>
-                </a:schemeClr>
-              </a:solidFill>
-            </a:endParaRPr>
-          </a:p>
-        </p:txBody>
-      </p:sp>
-      <p:sp>
-        <p:nvSpPr>
-          <p:cNvPr id="285" name="Rectangle 284"/>
-          <p:cNvSpPr/>
-          <p:nvPr/>
-        </p:nvSpPr>
-        <p:spPr>
-          <a:xfrm>
-            <a:off x="3949042" y="2979012"/>
-            <a:ext cx="1422935" cy="331958"/>
-          </a:xfrm>
-          <a:prstGeom prst="rect">
-            <a:avLst/>
-          </a:prstGeom>
-        </p:spPr>
-        <p:style>
-          <a:lnRef idx="2">
-            <a:schemeClr val="accent6">
-              <a:shade val="50000"/>
-            </a:schemeClr>
-          </a:lnRef>
-          <a:fillRef idx="1">
-            <a:schemeClr val="accent6"/>
-          </a:fillRef>
-          <a:effectRef idx="0">
-            <a:schemeClr val="accent6"/>
-          </a:effectRef>
-          <a:fontRef idx="minor">
-            <a:schemeClr val="lt1"/>
-          </a:fontRef>
-        </p:style>
-        <p:txBody>
-          <a:bodyPr rtlCol="0" anchor="ctr"/>
-          <a:lstStyle/>
-          <a:p>
-            <a:pPr algn="ctr"/>
-            <a:r>
-              <a:rPr lang="en-US" sz="1200" b="1" dirty="0" err="1" smtClean="0"/>
-              <a:t>SubmissionData</a:t>
-            </a:r>
-            <a:endParaRPr lang="en-SG" sz="1200" b="1" dirty="0"/>
-          </a:p>
-        </p:txBody>
-      </p:sp>
-      <p:sp>
-        <p:nvSpPr>
-          <p:cNvPr id="286" name="Flowchart: Decision 285"/>
-          <p:cNvSpPr/>
-          <p:nvPr/>
-        </p:nvSpPr>
-        <p:spPr>
-          <a:xfrm rot="5400000">
-            <a:off x="3695577" y="2712594"/>
-            <a:ext cx="152400" cy="152400"/>
-          </a:xfrm>
-          <a:prstGeom prst="flowChartDecision">
-            <a:avLst/>
-          </a:prstGeom>
-          <a:solidFill>
-            <a:schemeClr val="bg1"/>
-          </a:solidFill>
-        </p:spPr>
-        <p:style>
-          <a:lnRef idx="2">
-            <a:schemeClr val="accent5">
-              <a:shade val="50000"/>
-            </a:schemeClr>
-          </a:lnRef>
-          <a:fillRef idx="1">
-            <a:schemeClr val="accent5"/>
-          </a:fillRef>
-          <a:effectRef idx="0">
-            <a:schemeClr val="accent5"/>
-          </a:effectRef>
-          <a:fontRef idx="minor">
-            <a:schemeClr val="lt1"/>
-          </a:fontRef>
-        </p:style>
-        <p:txBody>
-          <a:bodyPr rtlCol="0" anchor="ctr"/>
-          <a:lstStyle/>
-          <a:p>
-            <a:pPr algn="ctr"/>
-            <a:endParaRPr lang="en-US"/>
-          </a:p>
-        </p:txBody>
-      </p:sp>
-      <p:cxnSp>
-        <p:nvCxnSpPr>
-          <p:cNvPr id="287" name="Elbow Connector 186"/>
-          <p:cNvCxnSpPr>
-            <a:stCxn id="286" idx="3"/>
-            <a:endCxn id="285" idx="1"/>
-          </p:cNvCxnSpPr>
-          <p:nvPr/>
-        </p:nvCxnSpPr>
-        <p:spPr>
-          <a:xfrm rot="16200000" flipH="1">
-            <a:off x="3720411" y="2916359"/>
-            <a:ext cx="279997" cy="177265"/>
-          </a:xfrm>
-          <a:prstGeom prst="bentConnector2">
-            <a:avLst/>
-          </a:prstGeom>
-          <a:ln>
-            <a:tailEnd type="arrow"/>
-          </a:ln>
-        </p:spPr>
-        <p:style>
-          <a:lnRef idx="2">
-            <a:schemeClr val="accent5">
-              <a:shade val="50000"/>
-            </a:schemeClr>
-          </a:lnRef>
-          <a:fillRef idx="1">
-            <a:schemeClr val="accent5"/>
-          </a:fillRef>
-          <a:effectRef idx="0">
-            <a:schemeClr val="accent5"/>
-          </a:effectRef>
-          <a:fontRef idx="minor">
-            <a:schemeClr val="lt1"/>
-          </a:fontRef>
-        </p:style>
-      </p:cxnSp>
-      <p:sp>
-        <p:nvSpPr>
-          <p:cNvPr id="288" name="TextBox 287"/>
-          <p:cNvSpPr txBox="1"/>
-          <p:nvPr/>
-        </p:nvSpPr>
-        <p:spPr>
-          <a:xfrm>
-            <a:off x="3746110" y="2899610"/>
-            <a:ext cx="228600" cy="369332"/>
-          </a:xfrm>
-          <a:prstGeom prst="rect">
-            <a:avLst/>
-          </a:prstGeom>
-          <a:noFill/>
-        </p:spPr>
-        <p:txBody>
-          <a:bodyPr wrap="square" rtlCol="0">
-            <a:spAutoFit/>
-          </a:bodyPr>
-          <a:lstStyle/>
-          <a:p>
-            <a:r>
-              <a:rPr lang="en-US" dirty="0" smtClean="0">
-                <a:solidFill>
-                  <a:schemeClr val="accent5">
-                    <a:lumMod val="75000"/>
-                  </a:schemeClr>
-                </a:solidFill>
-              </a:rPr>
-              <a:t>*</a:t>
-            </a:r>
-            <a:endParaRPr lang="en-US" dirty="0">
-              <a:solidFill>
-                <a:schemeClr val="accent5">
-                  <a:lumMod val="75000"/>
-                </a:schemeClr>
-              </a:solidFill>
-            </a:endParaRPr>
-          </a:p>
-        </p:txBody>
-      </p:sp>
-      <p:sp>
-        <p:nvSpPr>
-          <p:cNvPr id="289" name="Rectangle 288"/>
-          <p:cNvSpPr/>
-          <p:nvPr/>
-        </p:nvSpPr>
-        <p:spPr>
-          <a:xfrm>
-            <a:off x="5078674" y="407828"/>
-            <a:ext cx="1550726" cy="361770"/>
-          </a:xfrm>
-          <a:prstGeom prst="rect">
-            <a:avLst/>
-          </a:prstGeom>
-        </p:spPr>
-        <p:style>
-          <a:lnRef idx="2">
-            <a:schemeClr val="accent6">
-              <a:shade val="50000"/>
-            </a:schemeClr>
-          </a:lnRef>
-          <a:fillRef idx="1">
-            <a:schemeClr val="accent6"/>
-          </a:fillRef>
-          <a:effectRef idx="0">
-            <a:schemeClr val="accent6"/>
-          </a:effectRef>
-          <a:fontRef idx="minor">
-            <a:schemeClr val="lt1"/>
-          </a:fontRef>
-        </p:style>
-        <p:txBody>
-          <a:bodyPr rtlCol="0" anchor="ctr"/>
-          <a:lstStyle/>
-          <a:p>
-            <a:pPr algn="ctr"/>
-            <a:r>
-              <a:rPr lang="en-US" sz="1600" b="1" dirty="0" err="1" smtClean="0"/>
-              <a:t>InstructorData</a:t>
-            </a:r>
-            <a:endParaRPr lang="en-SG" sz="1600" b="1" dirty="0"/>
-          </a:p>
-        </p:txBody>
-      </p:sp>
-      <p:sp>
-        <p:nvSpPr>
-          <p:cNvPr id="290" name="Rectangle 289"/>
-          <p:cNvSpPr/>
-          <p:nvPr/>
-        </p:nvSpPr>
-        <p:spPr>
-          <a:xfrm>
-            <a:off x="6396484" y="1117970"/>
-            <a:ext cx="1550726" cy="361770"/>
-          </a:xfrm>
-          <a:prstGeom prst="rect">
-            <a:avLst/>
-          </a:prstGeom>
-        </p:spPr>
-        <p:style>
-          <a:lnRef idx="2">
-            <a:schemeClr val="accent6">
-              <a:shade val="50000"/>
-            </a:schemeClr>
-          </a:lnRef>
-          <a:fillRef idx="1">
-            <a:schemeClr val="accent6"/>
-          </a:fillRef>
-          <a:effectRef idx="0">
-            <a:schemeClr val="accent6"/>
-          </a:effectRef>
-          <a:fontRef idx="minor">
-            <a:schemeClr val="lt1"/>
-          </a:fontRef>
-        </p:style>
-        <p:txBody>
-          <a:bodyPr rtlCol="0" anchor="ctr"/>
-          <a:lstStyle/>
-          <a:p>
-            <a:pPr algn="ctr"/>
-            <a:r>
-              <a:rPr lang="en-US" sz="1600" b="1" dirty="0" err="1" smtClean="0"/>
-              <a:t>CourseData</a:t>
-            </a:r>
-            <a:endParaRPr lang="en-SG" sz="1600" b="1" dirty="0"/>
-          </a:p>
-        </p:txBody>
-      </p:sp>
-      <p:sp>
-        <p:nvSpPr>
-          <p:cNvPr id="291" name="Flowchart: Decision 290"/>
-          <p:cNvSpPr/>
-          <p:nvPr/>
-        </p:nvSpPr>
-        <p:spPr>
-          <a:xfrm rot="5400000">
-            <a:off x="6223130" y="1206986"/>
-            <a:ext cx="152400" cy="152400"/>
-          </a:xfrm>
-          <a:prstGeom prst="flowChartDecision">
-            <a:avLst/>
-          </a:prstGeom>
-          <a:solidFill>
-            <a:schemeClr val="bg1"/>
-          </a:solidFill>
-        </p:spPr>
-        <p:style>
-          <a:lnRef idx="2">
-            <a:schemeClr val="accent5">
-              <a:shade val="50000"/>
-            </a:schemeClr>
-          </a:lnRef>
-          <a:fillRef idx="1">
-            <a:schemeClr val="accent5"/>
-          </a:fillRef>
-          <a:effectRef idx="0">
-            <a:schemeClr val="accent5"/>
-          </a:effectRef>
-          <a:fontRef idx="minor">
-            <a:schemeClr val="lt1"/>
-          </a:fontRef>
-        </p:style>
-        <p:txBody>
-          <a:bodyPr rtlCol="0" anchor="ctr"/>
-          <a:lstStyle/>
-          <a:p>
-            <a:pPr algn="ctr"/>
-            <a:endParaRPr lang="en-US"/>
-          </a:p>
-        </p:txBody>
-      </p:sp>
-      <p:cxnSp>
-        <p:nvCxnSpPr>
-          <p:cNvPr id="292" name="Elbow Connector 190"/>
-          <p:cNvCxnSpPr>
-            <a:stCxn id="291" idx="1"/>
-          </p:cNvCxnSpPr>
-          <p:nvPr/>
-        </p:nvCxnSpPr>
-        <p:spPr>
-          <a:xfrm rot="16200000" flipV="1">
-            <a:off x="6051372" y="959028"/>
-            <a:ext cx="444987" cy="50930"/>
-          </a:xfrm>
-          <a:prstGeom prst="bentConnector3">
-            <a:avLst>
-              <a:gd name="adj1" fmla="val 50000"/>
-            </a:avLst>
-          </a:prstGeom>
-          <a:ln>
-            <a:tailEnd type="arrow"/>
-          </a:ln>
-        </p:spPr>
-        <p:style>
-          <a:lnRef idx="2">
-            <a:schemeClr val="accent5">
-              <a:shade val="50000"/>
-            </a:schemeClr>
-          </a:lnRef>
-          <a:fillRef idx="1">
-            <a:schemeClr val="accent5"/>
-          </a:fillRef>
-          <a:effectRef idx="0">
-            <a:schemeClr val="accent5"/>
-          </a:effectRef>
-          <a:fontRef idx="minor">
-            <a:schemeClr val="lt1"/>
-          </a:fontRef>
-        </p:style>
-      </p:cxnSp>
-      <p:sp>
-        <p:nvSpPr>
-          <p:cNvPr id="294" name="Rectangle 293"/>
-          <p:cNvSpPr/>
-          <p:nvPr/>
-        </p:nvSpPr>
-        <p:spPr>
-          <a:xfrm>
-            <a:off x="6781800" y="1798637"/>
-            <a:ext cx="1550726" cy="361770"/>
-          </a:xfrm>
-          <a:prstGeom prst="rect">
-            <a:avLst/>
-          </a:prstGeom>
-        </p:spPr>
-        <p:style>
-          <a:lnRef idx="2">
-            <a:schemeClr val="accent6">
-              <a:shade val="50000"/>
-            </a:schemeClr>
-          </a:lnRef>
-          <a:fillRef idx="1">
-            <a:schemeClr val="accent6"/>
-          </a:fillRef>
-          <a:effectRef idx="0">
-            <a:schemeClr val="accent6"/>
-          </a:effectRef>
-          <a:fontRef idx="minor">
-            <a:schemeClr val="lt1"/>
-          </a:fontRef>
-        </p:style>
-        <p:txBody>
-          <a:bodyPr rtlCol="0" anchor="ctr"/>
-          <a:lstStyle/>
-          <a:p>
-            <a:pPr algn="ctr"/>
-            <a:r>
-              <a:rPr lang="en-US" sz="1600" b="1" dirty="0" err="1" smtClean="0"/>
-              <a:t>EvaluationData</a:t>
-            </a:r>
-            <a:endParaRPr lang="en-SG" sz="1600" b="1" dirty="0"/>
-          </a:p>
-        </p:txBody>
-      </p:sp>
-      <p:sp>
-        <p:nvSpPr>
-          <p:cNvPr id="295" name="TextBox 294"/>
-          <p:cNvSpPr txBox="1"/>
-          <p:nvPr/>
-        </p:nvSpPr>
-        <p:spPr>
-          <a:xfrm>
-            <a:off x="6557516" y="1721923"/>
-            <a:ext cx="228600" cy="369332"/>
-          </a:xfrm>
-          <a:prstGeom prst="rect">
-            <a:avLst/>
-          </a:prstGeom>
-          <a:noFill/>
-        </p:spPr>
-        <p:txBody>
-          <a:bodyPr wrap="square" rtlCol="0">
-            <a:spAutoFit/>
-          </a:bodyPr>
-          <a:lstStyle/>
-          <a:p>
-            <a:r>
-              <a:rPr lang="en-US" dirty="0" smtClean="0">
-                <a:solidFill>
-                  <a:schemeClr val="accent5">
-                    <a:lumMod val="75000"/>
-                  </a:schemeClr>
-                </a:solidFill>
-              </a:rPr>
-              <a:t>*</a:t>
-            </a:r>
-            <a:endParaRPr lang="en-US" dirty="0">
-              <a:solidFill>
-                <a:schemeClr val="accent5">
-                  <a:lumMod val="75000"/>
-                </a:schemeClr>
-              </a:solidFill>
-            </a:endParaRPr>
-          </a:p>
-        </p:txBody>
-      </p:sp>
-      <p:sp>
-        <p:nvSpPr>
-          <p:cNvPr id="296" name="Flowchart: Decision 295"/>
-          <p:cNvSpPr/>
-          <p:nvPr/>
-        </p:nvSpPr>
-        <p:spPr>
-          <a:xfrm rot="5400000">
-            <a:off x="6477000" y="1493837"/>
-            <a:ext cx="152400" cy="152400"/>
-          </a:xfrm>
-          <a:prstGeom prst="flowChartDecision">
-            <a:avLst/>
-          </a:prstGeom>
-          <a:solidFill>
-            <a:schemeClr val="bg1"/>
-          </a:solidFill>
-        </p:spPr>
-        <p:style>
-          <a:lnRef idx="2">
-            <a:schemeClr val="accent5">
-              <a:shade val="50000"/>
-            </a:schemeClr>
-          </a:lnRef>
-          <a:fillRef idx="1">
-            <a:schemeClr val="accent5"/>
-          </a:fillRef>
-          <a:effectRef idx="0">
-            <a:schemeClr val="accent5"/>
-          </a:effectRef>
-          <a:fontRef idx="minor">
-            <a:schemeClr val="lt1"/>
-          </a:fontRef>
-        </p:style>
-        <p:txBody>
-          <a:bodyPr rtlCol="0" anchor="ctr"/>
-          <a:lstStyle/>
-          <a:p>
-            <a:pPr algn="ctr"/>
-            <a:endParaRPr lang="en-US"/>
-          </a:p>
-        </p:txBody>
-      </p:sp>
-      <p:cxnSp>
-        <p:nvCxnSpPr>
-          <p:cNvPr id="297" name="Elbow Connector 196"/>
-          <p:cNvCxnSpPr>
-            <a:stCxn id="296" idx="3"/>
-            <a:endCxn id="294" idx="1"/>
-          </p:cNvCxnSpPr>
-          <p:nvPr/>
-        </p:nvCxnSpPr>
-        <p:spPr>
-          <a:xfrm rot="16200000" flipH="1">
-            <a:off x="6500858" y="1698579"/>
-            <a:ext cx="333285" cy="228600"/>
-          </a:xfrm>
-          <a:prstGeom prst="bentConnector2">
-            <a:avLst/>
-          </a:prstGeom>
-          <a:ln>
-            <a:tailEnd type="arrow"/>
-          </a:ln>
-        </p:spPr>
-        <p:style>
-          <a:lnRef idx="2">
-            <a:schemeClr val="accent5">
-              <a:shade val="50000"/>
-            </a:schemeClr>
-          </a:lnRef>
-          <a:fillRef idx="1">
-            <a:schemeClr val="accent5"/>
-          </a:fillRef>
-          <a:effectRef idx="0">
-            <a:schemeClr val="accent5"/>
-          </a:effectRef>
-          <a:fontRef idx="minor">
-            <a:schemeClr val="lt1"/>
-          </a:fontRef>
-        </p:style>
-      </p:cxnSp>
-      <p:sp>
-        <p:nvSpPr>
-          <p:cNvPr id="298" name="Rectangle 297"/>
-          <p:cNvSpPr/>
-          <p:nvPr/>
-        </p:nvSpPr>
-        <p:spPr>
-          <a:xfrm>
-            <a:off x="6781806" y="2408237"/>
-            <a:ext cx="1524000" cy="361770"/>
-          </a:xfrm>
-          <a:prstGeom prst="rect">
-            <a:avLst/>
-          </a:prstGeom>
-        </p:spPr>
-        <p:style>
-          <a:lnRef idx="2">
-            <a:schemeClr val="accent5">
-              <a:shade val="50000"/>
-            </a:schemeClr>
-          </a:lnRef>
-          <a:fillRef idx="1">
-            <a:schemeClr val="accent5"/>
-          </a:fillRef>
-          <a:effectRef idx="0">
-            <a:schemeClr val="accent5"/>
-          </a:effectRef>
-          <a:fontRef idx="minor">
-            <a:schemeClr val="lt1"/>
-          </a:fontRef>
-        </p:style>
-        <p:txBody>
-          <a:bodyPr rtlCol="0" anchor="ctr"/>
-          <a:lstStyle/>
-          <a:p>
-            <a:pPr algn="ctr"/>
-            <a:r>
-              <a:rPr lang="en-US" sz="1600" b="1" dirty="0" err="1" smtClean="0"/>
-              <a:t>TeamData</a:t>
-            </a:r>
-            <a:endParaRPr lang="en-SG" sz="1600" b="1" dirty="0"/>
-          </a:p>
-        </p:txBody>
-      </p:sp>
-      <p:cxnSp>
-        <p:nvCxnSpPr>
-          <p:cNvPr id="299" name="Elbow Connector 186"/>
-          <p:cNvCxnSpPr>
-            <a:stCxn id="296" idx="3"/>
-            <a:endCxn id="298" idx="1"/>
-          </p:cNvCxnSpPr>
-          <p:nvPr/>
-        </p:nvCxnSpPr>
-        <p:spPr>
-          <a:xfrm rot="16200000" flipH="1">
-            <a:off x="6196061" y="2003376"/>
-            <a:ext cx="942885" cy="228606"/>
-          </a:xfrm>
-          <a:prstGeom prst="bentConnector2">
-            <a:avLst/>
-          </a:prstGeom>
-          <a:ln>
-            <a:tailEnd type="arrow"/>
-          </a:ln>
-        </p:spPr>
-        <p:style>
-          <a:lnRef idx="2">
-            <a:schemeClr val="accent5">
-              <a:shade val="50000"/>
-            </a:schemeClr>
-          </a:lnRef>
-          <a:fillRef idx="1">
-            <a:schemeClr val="accent5"/>
-          </a:fillRef>
-          <a:effectRef idx="0">
-            <a:schemeClr val="accent5"/>
-          </a:effectRef>
-          <a:fontRef idx="minor">
-            <a:schemeClr val="lt1"/>
-          </a:fontRef>
-        </p:style>
-      </p:cxnSp>
-      <p:sp>
-        <p:nvSpPr>
-          <p:cNvPr id="300" name="TextBox 299"/>
-          <p:cNvSpPr txBox="1"/>
-          <p:nvPr/>
-        </p:nvSpPr>
-        <p:spPr>
-          <a:xfrm>
-            <a:off x="6553206" y="2316810"/>
-            <a:ext cx="228600" cy="369332"/>
-          </a:xfrm>
-          <a:prstGeom prst="rect">
-            <a:avLst/>
-          </a:prstGeom>
-          <a:noFill/>
-        </p:spPr>
-        <p:txBody>
-          <a:bodyPr wrap="square" rtlCol="0">
-            <a:spAutoFit/>
-          </a:bodyPr>
-          <a:lstStyle/>
-          <a:p>
-            <a:r>
-              <a:rPr lang="en-US" dirty="0" smtClean="0">
-                <a:solidFill>
-                  <a:schemeClr val="accent5">
-                    <a:lumMod val="75000"/>
-                  </a:schemeClr>
-                </a:solidFill>
-              </a:rPr>
-              <a:t>*</a:t>
-            </a:r>
-            <a:endParaRPr lang="en-US" dirty="0">
-              <a:solidFill>
-                <a:schemeClr val="accent5">
-                  <a:lumMod val="75000"/>
-                </a:schemeClr>
-              </a:solidFill>
-            </a:endParaRPr>
-          </a:p>
-        </p:txBody>
-      </p:sp>
-      <p:sp>
-        <p:nvSpPr>
-          <p:cNvPr id="301" name="Rectangle 300"/>
-          <p:cNvSpPr/>
-          <p:nvPr/>
-        </p:nvSpPr>
-        <p:spPr>
-          <a:xfrm>
-            <a:off x="7162806" y="3046032"/>
-            <a:ext cx="1550726" cy="361770"/>
-          </a:xfrm>
-          <a:prstGeom prst="rect">
-            <a:avLst/>
-          </a:prstGeom>
-        </p:spPr>
-        <p:style>
-          <a:lnRef idx="2">
-            <a:schemeClr val="accent6">
-              <a:shade val="50000"/>
-            </a:schemeClr>
-          </a:lnRef>
-          <a:fillRef idx="1">
-            <a:schemeClr val="accent6"/>
-          </a:fillRef>
-          <a:effectRef idx="0">
-            <a:schemeClr val="accent6"/>
-          </a:effectRef>
-          <a:fontRef idx="minor">
-            <a:schemeClr val="lt1"/>
-          </a:fontRef>
-        </p:style>
-        <p:txBody>
-          <a:bodyPr rtlCol="0" anchor="ctr"/>
-          <a:lstStyle/>
-          <a:p>
-            <a:pPr algn="ctr"/>
-            <a:r>
-              <a:rPr lang="en-US" sz="1600" b="1" dirty="0" err="1" smtClean="0"/>
-              <a:t>StudentData</a:t>
-            </a:r>
-            <a:endParaRPr lang="en-SG" sz="1600" b="1" dirty="0"/>
-          </a:p>
-        </p:txBody>
-      </p:sp>
-      <p:sp>
-        <p:nvSpPr>
-          <p:cNvPr id="302" name="Flowchart: Decision 301"/>
-          <p:cNvSpPr/>
-          <p:nvPr/>
-        </p:nvSpPr>
-        <p:spPr>
-          <a:xfrm rot="5400000">
-            <a:off x="6858000" y="2789237"/>
-            <a:ext cx="152400" cy="152400"/>
-          </a:xfrm>
-          <a:prstGeom prst="flowChartDecision">
-            <a:avLst/>
-          </a:prstGeom>
-          <a:solidFill>
-            <a:schemeClr val="bg1"/>
-          </a:solidFill>
-        </p:spPr>
-        <p:style>
-          <a:lnRef idx="2">
-            <a:schemeClr val="accent5">
-              <a:shade val="50000"/>
-            </a:schemeClr>
-          </a:lnRef>
-          <a:fillRef idx="1">
-            <a:schemeClr val="accent5"/>
-          </a:fillRef>
-          <a:effectRef idx="0">
-            <a:schemeClr val="accent5"/>
-          </a:effectRef>
-          <a:fontRef idx="minor">
-            <a:schemeClr val="lt1"/>
-          </a:fontRef>
-        </p:style>
-        <p:txBody>
-          <a:bodyPr rtlCol="0" anchor="ctr"/>
-          <a:lstStyle/>
-          <a:p>
-            <a:pPr algn="ctr"/>
-            <a:endParaRPr lang="en-US"/>
-          </a:p>
-        </p:txBody>
-      </p:sp>
-      <p:cxnSp>
-        <p:nvCxnSpPr>
-          <p:cNvPr id="303" name="Elbow Connector 186"/>
-          <p:cNvCxnSpPr>
-            <a:stCxn id="302" idx="3"/>
-            <a:endCxn id="301" idx="1"/>
-          </p:cNvCxnSpPr>
-          <p:nvPr/>
-        </p:nvCxnSpPr>
-        <p:spPr>
-          <a:xfrm rot="16200000" flipH="1">
-            <a:off x="6905863" y="2969974"/>
-            <a:ext cx="285280" cy="228606"/>
-          </a:xfrm>
-          <a:prstGeom prst="bentConnector2">
-            <a:avLst/>
-          </a:prstGeom>
-          <a:ln>
-            <a:tailEnd type="arrow"/>
-          </a:ln>
-        </p:spPr>
-        <p:style>
-          <a:lnRef idx="2">
-            <a:schemeClr val="accent5">
-              <a:shade val="50000"/>
-            </a:schemeClr>
-          </a:lnRef>
-          <a:fillRef idx="1">
-            <a:schemeClr val="accent5"/>
-          </a:fillRef>
-          <a:effectRef idx="0">
-            <a:schemeClr val="accent5"/>
-          </a:effectRef>
-          <a:fontRef idx="minor">
-            <a:schemeClr val="lt1"/>
-          </a:fontRef>
-        </p:style>
-      </p:cxnSp>
-      <p:sp>
-        <p:nvSpPr>
-          <p:cNvPr id="304" name="TextBox 303"/>
-          <p:cNvSpPr txBox="1"/>
-          <p:nvPr/>
-        </p:nvSpPr>
-        <p:spPr>
-          <a:xfrm>
-            <a:off x="6934205" y="2941637"/>
-            <a:ext cx="228600" cy="369332"/>
-          </a:xfrm>
-          <a:prstGeom prst="rect">
-            <a:avLst/>
-          </a:prstGeom>
-          <a:noFill/>
-        </p:spPr>
-        <p:txBody>
-          <a:bodyPr wrap="square" rtlCol="0">
-            <a:spAutoFit/>
-          </a:bodyPr>
-          <a:lstStyle/>
-          <a:p>
-            <a:r>
-              <a:rPr lang="en-US" dirty="0" smtClean="0">
-                <a:solidFill>
-                  <a:schemeClr val="accent5">
-                    <a:lumMod val="75000"/>
-                  </a:schemeClr>
-                </a:solidFill>
-              </a:rPr>
-              <a:t>*</a:t>
-            </a:r>
-            <a:endParaRPr lang="en-US" dirty="0">
-              <a:solidFill>
-                <a:schemeClr val="accent5">
-                  <a:lumMod val="75000"/>
-                </a:schemeClr>
-              </a:solidFill>
-            </a:endParaRPr>
-          </a:p>
-        </p:txBody>
-      </p:sp>
-      <p:sp>
-        <p:nvSpPr>
-          <p:cNvPr id="305" name="TextBox 304"/>
-          <p:cNvSpPr txBox="1"/>
-          <p:nvPr/>
-        </p:nvSpPr>
-        <p:spPr>
-          <a:xfrm>
-            <a:off x="914400" y="46037"/>
-            <a:ext cx="533400" cy="369332"/>
-          </a:xfrm>
-          <a:prstGeom prst="rect">
-            <a:avLst/>
-          </a:prstGeom>
-          <a:noFill/>
-        </p:spPr>
-        <p:txBody>
-          <a:bodyPr wrap="square" rtlCol="0">
-            <a:spAutoFit/>
-          </a:bodyPr>
-          <a:lstStyle/>
-          <a:p>
-            <a:r>
-              <a:rPr lang="en-US" dirty="0" smtClean="0"/>
-              <a:t>(a)</a:t>
-            </a:r>
-            <a:endParaRPr lang="en-US" dirty="0"/>
-          </a:p>
-        </p:txBody>
-      </p:sp>
-      <p:sp>
-        <p:nvSpPr>
-          <p:cNvPr id="306" name="TextBox 305"/>
-          <p:cNvSpPr txBox="1"/>
-          <p:nvPr/>
-        </p:nvSpPr>
-        <p:spPr>
-          <a:xfrm>
-            <a:off x="2653643" y="62399"/>
-            <a:ext cx="489444" cy="369332"/>
-          </a:xfrm>
-          <a:prstGeom prst="rect">
-            <a:avLst/>
-          </a:prstGeom>
-          <a:noFill/>
-        </p:spPr>
-        <p:txBody>
-          <a:bodyPr wrap="square" rtlCol="0">
-            <a:spAutoFit/>
-          </a:bodyPr>
-          <a:lstStyle/>
-          <a:p>
-            <a:r>
-              <a:rPr lang="en-US" dirty="0" smtClean="0"/>
-              <a:t>(b)</a:t>
-            </a:r>
-            <a:endParaRPr lang="en-US" dirty="0"/>
-          </a:p>
-        </p:txBody>
-      </p:sp>
-      <p:sp>
-        <p:nvSpPr>
-          <p:cNvPr id="307" name="TextBox 306"/>
-          <p:cNvSpPr txBox="1"/>
-          <p:nvPr/>
-        </p:nvSpPr>
-        <p:spPr>
-          <a:xfrm>
-            <a:off x="5042654" y="62399"/>
-            <a:ext cx="533400" cy="369332"/>
-          </a:xfrm>
-          <a:prstGeom prst="rect">
-            <a:avLst/>
-          </a:prstGeom>
-          <a:noFill/>
-        </p:spPr>
-        <p:txBody>
-          <a:bodyPr wrap="square" rtlCol="0">
-            <a:spAutoFit/>
-          </a:bodyPr>
-          <a:lstStyle/>
-          <a:p>
-            <a:r>
-              <a:rPr lang="en-US" dirty="0" smtClean="0"/>
-              <a:t>(c)</a:t>
-            </a:r>
-            <a:endParaRPr lang="en-US" dirty="0"/>
-          </a:p>
-        </p:txBody>
-      </p:sp>
-      <p:sp>
-        <p:nvSpPr>
-          <p:cNvPr id="61" name="Rectangle 60"/>
-          <p:cNvSpPr/>
-          <p:nvPr/>
-        </p:nvSpPr>
-        <p:spPr>
-          <a:xfrm>
-            <a:off x="990601" y="1525751"/>
-            <a:ext cx="1219198" cy="272886"/>
-          </a:xfrm>
-          <a:prstGeom prst="rect">
-            <a:avLst/>
-          </a:prstGeom>
-        </p:spPr>
-        <p:style>
-          <a:lnRef idx="2">
-            <a:schemeClr val="accent6">
-              <a:shade val="50000"/>
-            </a:schemeClr>
-          </a:lnRef>
-          <a:fillRef idx="1">
-            <a:schemeClr val="accent6"/>
-          </a:fillRef>
-          <a:effectRef idx="0">
-            <a:schemeClr val="accent6"/>
-          </a:effectRef>
-          <a:fontRef idx="minor">
-            <a:schemeClr val="lt1"/>
-          </a:fontRef>
-        </p:style>
-        <p:txBody>
-          <a:bodyPr rtlCol="0" anchor="ctr"/>
-          <a:lstStyle/>
-          <a:p>
-            <a:pPr algn="ctr"/>
-            <a:r>
-              <a:rPr lang="en-US" sz="1200" b="1" dirty="0" err="1" smtClean="0"/>
-              <a:t>InstructorData</a:t>
-            </a:r>
-            <a:endParaRPr lang="en-SG" sz="1200" b="1" dirty="0"/>
-          </a:p>
-        </p:txBody>
-      </p:sp>
-      <p:sp>
-        <p:nvSpPr>
-          <p:cNvPr id="62" name="TextBox 61"/>
-          <p:cNvSpPr txBox="1"/>
-          <p:nvPr/>
-        </p:nvSpPr>
-        <p:spPr>
-          <a:xfrm>
-            <a:off x="770070" y="1418268"/>
-            <a:ext cx="172435" cy="369332"/>
-          </a:xfrm>
-          <a:prstGeom prst="rect">
-            <a:avLst/>
-          </a:prstGeom>
-          <a:noFill/>
-        </p:spPr>
-        <p:txBody>
-          <a:bodyPr wrap="square" rtlCol="0">
-            <a:spAutoFit/>
-          </a:bodyPr>
-          <a:lstStyle/>
-          <a:p>
-            <a:r>
-              <a:rPr lang="en-US" dirty="0" smtClean="0">
-                <a:solidFill>
-                  <a:schemeClr val="accent5">
-                    <a:lumMod val="75000"/>
-                  </a:schemeClr>
-                </a:solidFill>
-              </a:rPr>
-              <a:t>*</a:t>
-            </a:r>
-            <a:endParaRPr lang="en-US" dirty="0">
-              <a:solidFill>
-                <a:schemeClr val="accent5">
-                  <a:lumMod val="75000"/>
-                </a:schemeClr>
-              </a:solidFill>
-            </a:endParaRPr>
-          </a:p>
-        </p:txBody>
-      </p:sp>
-      <p:sp>
-        <p:nvSpPr>
-          <p:cNvPr id="63" name="Rectangle 62"/>
-          <p:cNvSpPr/>
-          <p:nvPr/>
-        </p:nvSpPr>
-        <p:spPr>
-          <a:xfrm>
-            <a:off x="977900" y="1971417"/>
-            <a:ext cx="1231899" cy="272886"/>
-          </a:xfrm>
-          <a:prstGeom prst="rect">
-            <a:avLst/>
-          </a:prstGeom>
-        </p:spPr>
-        <p:style>
-          <a:lnRef idx="2">
-            <a:schemeClr val="accent6">
-              <a:shade val="50000"/>
-            </a:schemeClr>
-          </a:lnRef>
-          <a:fillRef idx="1">
-            <a:schemeClr val="accent6"/>
-          </a:fillRef>
-          <a:effectRef idx="0">
-            <a:schemeClr val="accent6"/>
-          </a:effectRef>
-          <a:fontRef idx="minor">
-            <a:schemeClr val="lt1"/>
-          </a:fontRef>
-        </p:style>
-        <p:txBody>
-          <a:bodyPr rtlCol="0" anchor="ctr"/>
-          <a:lstStyle/>
-          <a:p>
-            <a:pPr algn="ctr"/>
-            <a:r>
-              <a:rPr lang="en-US" sz="1200" b="1" dirty="0" err="1" smtClean="0"/>
-              <a:t>StudentData</a:t>
-            </a:r>
-            <a:endParaRPr lang="en-SG" sz="1200" b="1" dirty="0"/>
-          </a:p>
-        </p:txBody>
-      </p:sp>
-      <p:sp>
-        <p:nvSpPr>
-          <p:cNvPr id="64" name="TextBox 63"/>
-          <p:cNvSpPr txBox="1"/>
-          <p:nvPr/>
-        </p:nvSpPr>
-        <p:spPr>
-          <a:xfrm>
-            <a:off x="770070" y="1886345"/>
-            <a:ext cx="172435" cy="369332"/>
-          </a:xfrm>
-          <a:prstGeom prst="rect">
-            <a:avLst/>
-          </a:prstGeom>
-          <a:noFill/>
-        </p:spPr>
-        <p:txBody>
-          <a:bodyPr wrap="square" rtlCol="0">
-            <a:spAutoFit/>
-          </a:bodyPr>
-          <a:lstStyle/>
-          <a:p>
-            <a:r>
-              <a:rPr lang="en-US" dirty="0" smtClean="0">
-                <a:solidFill>
-                  <a:schemeClr val="accent5">
-                    <a:lumMod val="75000"/>
-                  </a:schemeClr>
-                </a:solidFill>
-              </a:rPr>
-              <a:t>*</a:t>
-            </a:r>
-            <a:endParaRPr lang="en-US" dirty="0">
-              <a:solidFill>
-                <a:schemeClr val="accent5">
-                  <a:lumMod val="75000"/>
-                </a:schemeClr>
-              </a:solidFill>
-            </a:endParaRPr>
-          </a:p>
-        </p:txBody>
-      </p:sp>
-      <p:cxnSp>
-        <p:nvCxnSpPr>
-          <p:cNvPr id="265" name="Elbow Connector 187"/>
-          <p:cNvCxnSpPr>
-            <a:stCxn id="263" idx="3"/>
-            <a:endCxn id="61" idx="1"/>
-          </p:cNvCxnSpPr>
-          <p:nvPr/>
-        </p:nvCxnSpPr>
-        <p:spPr>
-          <a:xfrm rot="16200000" flipH="1">
-            <a:off x="487322" y="1158914"/>
-            <a:ext cx="625557" cy="381001"/>
-          </a:xfrm>
-          <a:prstGeom prst="bentConnector2">
-            <a:avLst/>
-          </a:prstGeom>
-          <a:ln>
-            <a:tailEnd type="arrow"/>
-          </a:ln>
-        </p:spPr>
-        <p:style>
-          <a:lnRef idx="2">
-            <a:schemeClr val="accent5">
-              <a:shade val="50000"/>
-            </a:schemeClr>
-          </a:lnRef>
-          <a:fillRef idx="1">
-            <a:schemeClr val="accent5"/>
-          </a:fillRef>
-          <a:effectRef idx="0">
-            <a:schemeClr val="accent5"/>
-          </a:effectRef>
-          <a:fontRef idx="minor">
-            <a:schemeClr val="lt1"/>
-          </a:fontRef>
-        </p:style>
-      </p:cxnSp>
-      <p:sp>
-        <p:nvSpPr>
-          <p:cNvPr id="70" name="Rectangle 69"/>
-          <p:cNvSpPr/>
-          <p:nvPr/>
-        </p:nvSpPr>
-        <p:spPr>
-          <a:xfrm>
-            <a:off x="977900" y="2355752"/>
-            <a:ext cx="1231899" cy="272886"/>
-          </a:xfrm>
-          <a:prstGeom prst="rect">
-            <a:avLst/>
-          </a:prstGeom>
-        </p:spPr>
-        <p:style>
-          <a:lnRef idx="2">
-            <a:schemeClr val="accent6">
-              <a:shade val="50000"/>
-            </a:schemeClr>
-          </a:lnRef>
-          <a:fillRef idx="1">
-            <a:schemeClr val="accent6"/>
-          </a:fillRef>
-          <a:effectRef idx="0">
-            <a:schemeClr val="accent6"/>
-          </a:effectRef>
-          <a:fontRef idx="minor">
-            <a:schemeClr val="lt1"/>
-          </a:fontRef>
-        </p:style>
-        <p:txBody>
-          <a:bodyPr rtlCol="0" anchor="ctr"/>
-          <a:lstStyle/>
-          <a:p>
-            <a:pPr algn="ctr"/>
-            <a:r>
-              <a:rPr lang="en-US" sz="1200" b="1" dirty="0" err="1" smtClean="0"/>
-              <a:t>CourseData</a:t>
-            </a:r>
-            <a:endParaRPr lang="en-SG" sz="1200" b="1" dirty="0"/>
-          </a:p>
-        </p:txBody>
-      </p:sp>
-      <p:sp>
-        <p:nvSpPr>
-          <p:cNvPr id="71" name="TextBox 70"/>
-          <p:cNvSpPr txBox="1"/>
-          <p:nvPr/>
-        </p:nvSpPr>
-        <p:spPr>
-          <a:xfrm>
-            <a:off x="770070" y="2260985"/>
-            <a:ext cx="172435" cy="369332"/>
-          </a:xfrm>
-          <a:prstGeom prst="rect">
-            <a:avLst/>
-          </a:prstGeom>
-          <a:noFill/>
-        </p:spPr>
-        <p:txBody>
-          <a:bodyPr wrap="square" rtlCol="0">
-            <a:spAutoFit/>
-          </a:bodyPr>
-          <a:lstStyle/>
-          <a:p>
-            <a:r>
-              <a:rPr lang="en-US" dirty="0" smtClean="0">
-                <a:solidFill>
-                  <a:schemeClr val="accent5">
-                    <a:lumMod val="75000"/>
-                  </a:schemeClr>
-                </a:solidFill>
-              </a:rPr>
-              <a:t>*</a:t>
-            </a:r>
-            <a:endParaRPr lang="en-US" dirty="0">
-              <a:solidFill>
-                <a:schemeClr val="accent5">
-                  <a:lumMod val="75000"/>
-                </a:schemeClr>
-              </a:solidFill>
-            </a:endParaRPr>
-          </a:p>
-        </p:txBody>
-      </p:sp>
-      <p:sp>
-        <p:nvSpPr>
-          <p:cNvPr id="72" name="Rectangle 71"/>
-          <p:cNvSpPr/>
-          <p:nvPr/>
-        </p:nvSpPr>
-        <p:spPr>
-          <a:xfrm>
-            <a:off x="977900" y="3055310"/>
-            <a:ext cx="1231900" cy="272886"/>
-          </a:xfrm>
-          <a:prstGeom prst="rect">
-            <a:avLst/>
-          </a:prstGeom>
-        </p:spPr>
-        <p:style>
-          <a:lnRef idx="2">
-            <a:schemeClr val="accent6">
-              <a:shade val="50000"/>
-            </a:schemeClr>
-          </a:lnRef>
-          <a:fillRef idx="1">
-            <a:schemeClr val="accent6"/>
-          </a:fillRef>
-          <a:effectRef idx="0">
-            <a:schemeClr val="accent6"/>
-          </a:effectRef>
-          <a:fontRef idx="minor">
-            <a:schemeClr val="lt1"/>
-          </a:fontRef>
-        </p:style>
-        <p:txBody>
-          <a:bodyPr rtlCol="0" anchor="ctr"/>
-          <a:lstStyle/>
-          <a:p>
-            <a:pPr algn="ctr"/>
-            <a:r>
-              <a:rPr lang="en-US" sz="1200" b="1" dirty="0" err="1" smtClean="0"/>
-              <a:t>SubmissionData</a:t>
-            </a:r>
-            <a:endParaRPr lang="en-SG" sz="1200" b="1" dirty="0"/>
-          </a:p>
-        </p:txBody>
-      </p:sp>
-      <p:sp>
-        <p:nvSpPr>
-          <p:cNvPr id="73" name="TextBox 72"/>
-          <p:cNvSpPr txBox="1"/>
-          <p:nvPr/>
-        </p:nvSpPr>
-        <p:spPr>
-          <a:xfrm>
-            <a:off x="756045" y="2958864"/>
-            <a:ext cx="172435" cy="369332"/>
-          </a:xfrm>
-          <a:prstGeom prst="rect">
-            <a:avLst/>
-          </a:prstGeom>
-          <a:noFill/>
-        </p:spPr>
-        <p:txBody>
-          <a:bodyPr wrap="square" rtlCol="0">
-            <a:spAutoFit/>
-          </a:bodyPr>
-          <a:lstStyle/>
-          <a:p>
-            <a:r>
-              <a:rPr lang="en-US" dirty="0" smtClean="0">
-                <a:solidFill>
-                  <a:schemeClr val="accent5">
-                    <a:lumMod val="75000"/>
-                  </a:schemeClr>
-                </a:solidFill>
-              </a:rPr>
-              <a:t>*</a:t>
-            </a:r>
-            <a:endParaRPr lang="en-US" dirty="0">
-              <a:solidFill>
-                <a:schemeClr val="accent5">
-                  <a:lumMod val="75000"/>
-                </a:schemeClr>
-              </a:solidFill>
-            </a:endParaRPr>
-          </a:p>
-        </p:txBody>
-      </p:sp>
-      <p:sp>
-        <p:nvSpPr>
-          <p:cNvPr id="78" name="Rectangle 77"/>
-          <p:cNvSpPr/>
-          <p:nvPr/>
-        </p:nvSpPr>
-        <p:spPr>
-          <a:xfrm>
-            <a:off x="977900" y="2714182"/>
-            <a:ext cx="1231900" cy="272886"/>
-          </a:xfrm>
-          <a:prstGeom prst="rect">
-            <a:avLst/>
-          </a:prstGeom>
-        </p:spPr>
-        <p:style>
-          <a:lnRef idx="2">
-            <a:schemeClr val="accent6">
-              <a:shade val="50000"/>
-            </a:schemeClr>
-          </a:lnRef>
-          <a:fillRef idx="1">
-            <a:schemeClr val="accent6"/>
-          </a:fillRef>
-          <a:effectRef idx="0">
-            <a:schemeClr val="accent6"/>
-          </a:effectRef>
-          <a:fontRef idx="minor">
-            <a:schemeClr val="lt1"/>
-          </a:fontRef>
-        </p:style>
-        <p:txBody>
-          <a:bodyPr rtlCol="0" anchor="ctr"/>
-          <a:lstStyle/>
-          <a:p>
-            <a:pPr algn="ctr"/>
-            <a:r>
-              <a:rPr lang="en-US" sz="1200" b="1" dirty="0" err="1" smtClean="0"/>
-              <a:t>EvaluationData</a:t>
-            </a:r>
-            <a:endParaRPr lang="en-SG" sz="1200" b="1" dirty="0"/>
-          </a:p>
-        </p:txBody>
-      </p:sp>
-      <p:sp>
-        <p:nvSpPr>
-          <p:cNvPr id="79" name="TextBox 78"/>
-          <p:cNvSpPr txBox="1"/>
-          <p:nvPr/>
-        </p:nvSpPr>
-        <p:spPr>
-          <a:xfrm>
-            <a:off x="770069" y="2620875"/>
-            <a:ext cx="172435" cy="369332"/>
-          </a:xfrm>
-          <a:prstGeom prst="rect">
-            <a:avLst/>
-          </a:prstGeom>
-          <a:noFill/>
-        </p:spPr>
-        <p:txBody>
-          <a:bodyPr wrap="square" rtlCol="0">
-            <a:spAutoFit/>
-          </a:bodyPr>
-          <a:lstStyle/>
-          <a:p>
-            <a:r>
-              <a:rPr lang="en-US" dirty="0" smtClean="0">
-                <a:solidFill>
-                  <a:schemeClr val="accent5">
-                    <a:lumMod val="75000"/>
-                  </a:schemeClr>
-                </a:solidFill>
-              </a:rPr>
-              <a:t>*</a:t>
-            </a:r>
-            <a:endParaRPr lang="en-US" dirty="0">
-              <a:solidFill>
-                <a:schemeClr val="accent5">
-                  <a:lumMod val="75000"/>
-                </a:schemeClr>
-              </a:solidFill>
-            </a:endParaRPr>
-          </a:p>
-        </p:txBody>
-      </p:sp>
-      <p:cxnSp>
-        <p:nvCxnSpPr>
-          <p:cNvPr id="80" name="Elbow Connector 193"/>
-          <p:cNvCxnSpPr/>
-          <p:nvPr/>
-        </p:nvCxnSpPr>
-        <p:spPr>
-          <a:xfrm flipV="1">
-            <a:off x="609602" y="2501475"/>
-            <a:ext cx="354273" cy="3"/>
-          </a:xfrm>
-          <a:prstGeom prst="bentConnector3">
-            <a:avLst>
-              <a:gd name="adj1" fmla="val 50000"/>
-            </a:avLst>
           </a:prstGeom>
           <a:ln>
             <a:tailEnd type="arrow"/>
@@ -5244,13 +3570,16 @@
       </p:cxnSp>
       <p:cxnSp>
         <p:nvCxnSpPr>
-          <p:cNvPr id="85" name="Elbow Connector 193"/>
-          <p:cNvCxnSpPr/>
+          <p:cNvPr id="267" name="Elbow Connector 193"/>
+          <p:cNvCxnSpPr>
+            <a:stCxn id="263" idx="3"/>
+            <a:endCxn id="257" idx="1"/>
+          </p:cNvCxnSpPr>
           <p:nvPr/>
         </p:nvCxnSpPr>
         <p:spPr>
           <a:xfrm rot="16200000" flipH="1">
-            <a:off x="-97776" y="1791733"/>
+            <a:off x="-100931" y="1747168"/>
             <a:ext cx="1775337" cy="354274"/>
           </a:xfrm>
           <a:prstGeom prst="bentConnector2">
@@ -5282,14 +3611,14 @@
           <p:cNvPr id="268" name="Elbow Connector 196"/>
           <p:cNvCxnSpPr>
             <a:stCxn id="263" idx="3"/>
-            <a:endCxn id="72" idx="1"/>
+            <a:endCxn id="258" idx="1"/>
           </p:cNvCxnSpPr>
           <p:nvPr/>
         </p:nvCxnSpPr>
         <p:spPr>
           <a:xfrm rot="16200000" flipH="1">
-            <a:off x="-283808" y="1930045"/>
-            <a:ext cx="2155116" cy="368300"/>
+            <a:off x="-328573" y="1974810"/>
+            <a:ext cx="2230620" cy="354274"/>
           </a:xfrm>
           <a:prstGeom prst="bentConnector2">
             <a:avLst/>
@@ -5317,14 +3646,14 @@
       </p:cxnSp>
       <p:sp>
         <p:nvSpPr>
-          <p:cNvPr id="106" name="TextBox 105"/>
+          <p:cNvPr id="269" name="TextBox 268"/>
           <p:cNvSpPr txBox="1"/>
           <p:nvPr/>
         </p:nvSpPr>
         <p:spPr>
           <a:xfrm>
-            <a:off x="6023105" y="769598"/>
-            <a:ext cx="228600" cy="276999"/>
+            <a:off x="762005" y="1180072"/>
+            <a:ext cx="228600" cy="369332"/>
           </a:xfrm>
           <a:prstGeom prst="rect">
             <a:avLst/>
@@ -5338,7 +3667,7 @@
           <a:lstStyle/>
           <a:p>
             <a:r>
-              <a:rPr lang="en-US" sz="1200" dirty="0" smtClean="0">
+              <a:rPr lang="en-US" dirty="0" smtClean="0">
                 <a:solidFill>
                   <a:schemeClr val="accent5">
                     <a:lumMod val="75000"/>
@@ -5347,7 +3676,7 @@
               </a:rPr>
               <a:t>*</a:t>
             </a:r>
-            <a:endParaRPr lang="en-US" sz="1200" dirty="0">
+            <a:endParaRPr lang="en-US" dirty="0">
               <a:solidFill>
                 <a:schemeClr val="accent5">
                   <a:lumMod val="75000"/>
@@ -5359,14 +3688,182 @@
       </p:sp>
       <p:sp>
         <p:nvSpPr>
-          <p:cNvPr id="107" name="Rectangle 106"/>
+          <p:cNvPr id="270" name="TextBox 269"/>
+          <p:cNvSpPr txBox="1"/>
+          <p:nvPr/>
+        </p:nvSpPr>
+        <p:spPr>
+          <a:xfrm>
+            <a:off x="748555" y="1619342"/>
+            <a:ext cx="228600" cy="369332"/>
+          </a:xfrm>
+          <a:prstGeom prst="rect">
+            <a:avLst/>
+          </a:prstGeom>
+          <a:noFill/>
+        </p:spPr>
+        <p:txBody>
+          <a:bodyPr wrap="square" rtlCol="0">
+            <a:spAutoFit/>
+          </a:bodyPr>
+          <a:lstStyle/>
+          <a:p>
+            <a:r>
+              <a:rPr lang="en-US" dirty="0" smtClean="0">
+                <a:solidFill>
+                  <a:schemeClr val="accent5">
+                    <a:lumMod val="75000"/>
+                  </a:schemeClr>
+                </a:solidFill>
+              </a:rPr>
+              <a:t>*</a:t>
+            </a:r>
+            <a:endParaRPr lang="en-US" dirty="0">
+              <a:solidFill>
+                <a:schemeClr val="accent5">
+                  <a:lumMod val="75000"/>
+                </a:schemeClr>
+              </a:solidFill>
+            </a:endParaRPr>
+          </a:p>
+        </p:txBody>
+      </p:sp>
+      <p:sp>
+        <p:nvSpPr>
+          <p:cNvPr id="271" name="TextBox 270"/>
+          <p:cNvSpPr txBox="1"/>
+          <p:nvPr/>
+        </p:nvSpPr>
+        <p:spPr>
+          <a:xfrm>
+            <a:off x="739590" y="2094472"/>
+            <a:ext cx="228600" cy="369332"/>
+          </a:xfrm>
+          <a:prstGeom prst="rect">
+            <a:avLst/>
+          </a:prstGeom>
+          <a:noFill/>
+        </p:spPr>
+        <p:txBody>
+          <a:bodyPr wrap="square" rtlCol="0">
+            <a:spAutoFit/>
+          </a:bodyPr>
+          <a:lstStyle/>
+          <a:p>
+            <a:r>
+              <a:rPr lang="en-US" dirty="0" smtClean="0">
+                <a:solidFill>
+                  <a:schemeClr val="accent5">
+                    <a:lumMod val="75000"/>
+                  </a:schemeClr>
+                </a:solidFill>
+              </a:rPr>
+              <a:t>*</a:t>
+            </a:r>
+            <a:endParaRPr lang="en-US" dirty="0">
+              <a:solidFill>
+                <a:schemeClr val="accent5">
+                  <a:lumMod val="75000"/>
+                </a:schemeClr>
+              </a:solidFill>
+            </a:endParaRPr>
+          </a:p>
+        </p:txBody>
+      </p:sp>
+      <p:sp>
+        <p:nvSpPr>
+          <p:cNvPr id="272" name="TextBox 271"/>
+          <p:cNvSpPr txBox="1"/>
+          <p:nvPr/>
+        </p:nvSpPr>
+        <p:spPr>
+          <a:xfrm>
+            <a:off x="739590" y="2554375"/>
+            <a:ext cx="228600" cy="369332"/>
+          </a:xfrm>
+          <a:prstGeom prst="rect">
+            <a:avLst/>
+          </a:prstGeom>
+          <a:noFill/>
+        </p:spPr>
+        <p:txBody>
+          <a:bodyPr wrap="square" rtlCol="0">
+            <a:spAutoFit/>
+          </a:bodyPr>
+          <a:lstStyle/>
+          <a:p>
+            <a:r>
+              <a:rPr lang="en-US" dirty="0" smtClean="0">
+                <a:solidFill>
+                  <a:schemeClr val="accent5">
+                    <a:lumMod val="75000"/>
+                  </a:schemeClr>
+                </a:solidFill>
+              </a:rPr>
+              <a:t>*</a:t>
+            </a:r>
+            <a:endParaRPr lang="en-US" dirty="0">
+              <a:solidFill>
+                <a:schemeClr val="accent5">
+                  <a:lumMod val="75000"/>
+                </a:schemeClr>
+              </a:solidFill>
+            </a:endParaRPr>
+          </a:p>
+        </p:txBody>
+      </p:sp>
+      <p:sp>
+        <p:nvSpPr>
+          <p:cNvPr id="273" name="TextBox 272"/>
+          <p:cNvSpPr txBox="1"/>
+          <p:nvPr/>
+        </p:nvSpPr>
+        <p:spPr>
+          <a:xfrm>
+            <a:off x="726140" y="2993645"/>
+            <a:ext cx="228600" cy="369332"/>
+          </a:xfrm>
+          <a:prstGeom prst="rect">
+            <a:avLst/>
+          </a:prstGeom>
+          <a:noFill/>
+        </p:spPr>
+        <p:txBody>
+          <a:bodyPr wrap="square" rtlCol="0">
+            <a:spAutoFit/>
+          </a:bodyPr>
+          <a:lstStyle/>
+          <a:p>
+            <a:r>
+              <a:rPr lang="en-US" dirty="0" smtClean="0">
+                <a:solidFill>
+                  <a:schemeClr val="accent5">
+                    <a:lumMod val="75000"/>
+                  </a:schemeClr>
+                </a:solidFill>
+              </a:rPr>
+              <a:t>*</a:t>
+            </a:r>
+            <a:endParaRPr lang="en-US" dirty="0">
+              <a:solidFill>
+                <a:schemeClr val="accent5">
+                  <a:lumMod val="75000"/>
+                </a:schemeClr>
+              </a:solidFill>
+            </a:endParaRPr>
+          </a:p>
+        </p:txBody>
+      </p:sp>
+      <p:sp>
+        <p:nvSpPr>
+          <p:cNvPr id="274" name="Rectangle 273"/>
           <p:cNvSpPr/>
           <p:nvPr/>
         </p:nvSpPr>
         <p:spPr>
           <a:xfrm>
-            <a:off x="7143269" y="429382"/>
-            <a:ext cx="1365941" cy="318661"/>
+            <a:off x="3124200" y="503237"/>
+            <a:ext cx="1550726" cy="361770"/>
           </a:xfrm>
           <a:prstGeom prst="rect">
             <a:avLst/>
@@ -5395,7 +3892,7 @@
             <a:pPr algn="ctr"/>
             <a:r>
               <a:rPr lang="en-US" sz="1600" b="1" dirty="0" err="1" smtClean="0"/>
-              <a:t>AccountData</a:t>
+              <a:t>EvaluationData</a:t>
             </a:r>
             <a:endParaRPr lang="en-SG" sz="1600" b="1" dirty="0"/>
           </a:p>
@@ -5403,13 +3900,13 @@
       </p:sp>
       <p:sp>
         <p:nvSpPr>
-          <p:cNvPr id="112" name="Flowchart: Decision 111"/>
+          <p:cNvPr id="275" name="Flowchart: Decision 274"/>
           <p:cNvSpPr/>
           <p:nvPr/>
         </p:nvSpPr>
         <p:spPr>
           <a:xfrm rot="5400000">
-            <a:off x="6978958" y="512512"/>
+            <a:off x="3200395" y="884237"/>
             <a:ext cx="152400" cy="152400"/>
           </a:xfrm>
           <a:prstGeom prst="flowChartDecision">
@@ -5446,22 +3943,20 @@
       </p:sp>
       <p:cxnSp>
         <p:nvCxnSpPr>
-          <p:cNvPr id="113" name="Elbow Connector 190"/>
+          <p:cNvPr id="276" name="Elbow Connector 186"/>
           <p:cNvCxnSpPr>
-            <a:stCxn id="112" idx="2"/>
-            <a:endCxn id="289" idx="3"/>
+            <a:stCxn id="275" idx="3"/>
+            <a:endCxn id="260" idx="1"/>
           </p:cNvCxnSpPr>
           <p:nvPr/>
         </p:nvCxnSpPr>
         <p:spPr>
-          <a:xfrm rot="10800000" flipV="1">
-            <a:off x="6629400" y="588711"/>
-            <a:ext cx="349558" cy="1"/>
-          </a:xfrm>
-          <a:prstGeom prst="bentConnector3">
-            <a:avLst>
-              <a:gd name="adj1" fmla="val 50000"/>
-            </a:avLst>
+          <a:xfrm rot="16200000" flipH="1">
+            <a:off x="3257872" y="1055359"/>
+            <a:ext cx="266050" cy="228605"/>
+          </a:xfrm>
+          <a:prstGeom prst="bentConnector2">
+            <a:avLst/>
           </a:prstGeom>
           <a:ln>
             <a:tailEnd type="arrow"/>
@@ -5486,14 +3981,14 @@
       </p:cxnSp>
       <p:sp>
         <p:nvSpPr>
-          <p:cNvPr id="123" name="TextBox 122"/>
+          <p:cNvPr id="277" name="TextBox 276"/>
           <p:cNvSpPr txBox="1"/>
           <p:nvPr/>
         </p:nvSpPr>
         <p:spPr>
           <a:xfrm>
-            <a:off x="6619428" y="387913"/>
-            <a:ext cx="228600" cy="276999"/>
+            <a:off x="3276600" y="1036637"/>
+            <a:ext cx="228600" cy="369332"/>
           </a:xfrm>
           <a:prstGeom prst="rect">
             <a:avLst/>
@@ -5507,7 +4002,7 @@
           <a:lstStyle/>
           <a:p>
             <a:r>
-              <a:rPr lang="en-US" sz="1200" dirty="0" smtClean="0">
+              <a:rPr lang="en-US" dirty="0" smtClean="0">
                 <a:solidFill>
                   <a:schemeClr val="accent5">
                     <a:lumMod val="75000"/>
@@ -5516,13 +4011,1229 @@
               </a:rPr>
               <a:t>*</a:t>
             </a:r>
-            <a:endParaRPr lang="en-US" sz="1200" dirty="0">
+            <a:endParaRPr lang="en-US" dirty="0">
               <a:solidFill>
                 <a:schemeClr val="accent5">
                   <a:lumMod val="75000"/>
                 </a:schemeClr>
               </a:solidFill>
             </a:endParaRPr>
+          </a:p>
+        </p:txBody>
+      </p:sp>
+      <p:sp>
+        <p:nvSpPr>
+          <p:cNvPr id="278" name="Rectangle 277"/>
+          <p:cNvSpPr/>
+          <p:nvPr/>
+        </p:nvSpPr>
+        <p:spPr>
+          <a:xfrm>
+            <a:off x="3886200" y="1759597"/>
+            <a:ext cx="1550726" cy="361770"/>
+          </a:xfrm>
+          <a:prstGeom prst="rect">
+            <a:avLst/>
+          </a:prstGeom>
+        </p:spPr>
+        <p:style>
+          <a:lnRef idx="2">
+            <a:schemeClr val="accent6">
+              <a:shade val="50000"/>
+            </a:schemeClr>
+          </a:lnRef>
+          <a:fillRef idx="1">
+            <a:schemeClr val="accent6"/>
+          </a:fillRef>
+          <a:effectRef idx="0">
+            <a:schemeClr val="accent6"/>
+          </a:effectRef>
+          <a:fontRef idx="minor">
+            <a:schemeClr val="lt1"/>
+          </a:fontRef>
+        </p:style>
+        <p:txBody>
+          <a:bodyPr rtlCol="0" anchor="ctr"/>
+          <a:lstStyle/>
+          <a:p>
+            <a:pPr algn="ctr"/>
+            <a:r>
+              <a:rPr lang="en-US" sz="1600" b="1" dirty="0" err="1" smtClean="0"/>
+              <a:t>StudentData</a:t>
+            </a:r>
+            <a:endParaRPr lang="en-SG" sz="1600" b="1" dirty="0"/>
+          </a:p>
+        </p:txBody>
+      </p:sp>
+      <p:sp>
+        <p:nvSpPr>
+          <p:cNvPr id="279" name="Flowchart: Decision 278"/>
+          <p:cNvSpPr/>
+          <p:nvPr/>
+        </p:nvSpPr>
+        <p:spPr>
+          <a:xfrm rot="5400000">
+            <a:off x="3581394" y="1502802"/>
+            <a:ext cx="152400" cy="152400"/>
+          </a:xfrm>
+          <a:prstGeom prst="flowChartDecision">
+            <a:avLst/>
+          </a:prstGeom>
+          <a:solidFill>
+            <a:schemeClr val="bg1"/>
+          </a:solidFill>
+        </p:spPr>
+        <p:style>
+          <a:lnRef idx="2">
+            <a:schemeClr val="accent5">
+              <a:shade val="50000"/>
+            </a:schemeClr>
+          </a:lnRef>
+          <a:fillRef idx="1">
+            <a:schemeClr val="accent5"/>
+          </a:fillRef>
+          <a:effectRef idx="0">
+            <a:schemeClr val="accent5"/>
+          </a:effectRef>
+          <a:fontRef idx="minor">
+            <a:schemeClr val="lt1"/>
+          </a:fontRef>
+        </p:style>
+        <p:txBody>
+          <a:bodyPr rtlCol="0" anchor="ctr"/>
+          <a:lstStyle/>
+          <a:p>
+            <a:pPr algn="ctr"/>
+            <a:endParaRPr lang="en-US"/>
+          </a:p>
+        </p:txBody>
+      </p:sp>
+      <p:cxnSp>
+        <p:nvCxnSpPr>
+          <p:cNvPr id="280" name="Elbow Connector 186"/>
+          <p:cNvCxnSpPr>
+            <a:stCxn id="279" idx="3"/>
+            <a:endCxn id="278" idx="1"/>
+          </p:cNvCxnSpPr>
+          <p:nvPr/>
+        </p:nvCxnSpPr>
+        <p:spPr>
+          <a:xfrm rot="16200000" flipH="1">
+            <a:off x="3629257" y="1683539"/>
+            <a:ext cx="285280" cy="228606"/>
+          </a:xfrm>
+          <a:prstGeom prst="bentConnector2">
+            <a:avLst/>
+          </a:prstGeom>
+          <a:ln>
+            <a:tailEnd type="arrow"/>
+          </a:ln>
+        </p:spPr>
+        <p:style>
+          <a:lnRef idx="2">
+            <a:schemeClr val="accent5">
+              <a:shade val="50000"/>
+            </a:schemeClr>
+          </a:lnRef>
+          <a:fillRef idx="1">
+            <a:schemeClr val="accent5"/>
+          </a:fillRef>
+          <a:effectRef idx="0">
+            <a:schemeClr val="accent5"/>
+          </a:effectRef>
+          <a:fontRef idx="minor">
+            <a:schemeClr val="lt1"/>
+          </a:fontRef>
+        </p:style>
+      </p:cxnSp>
+      <p:sp>
+        <p:nvSpPr>
+          <p:cNvPr id="281" name="TextBox 280"/>
+          <p:cNvSpPr txBox="1"/>
+          <p:nvPr/>
+        </p:nvSpPr>
+        <p:spPr>
+          <a:xfrm>
+            <a:off x="3657599" y="1655202"/>
+            <a:ext cx="228600" cy="369332"/>
+          </a:xfrm>
+          <a:prstGeom prst="rect">
+            <a:avLst/>
+          </a:prstGeom>
+          <a:noFill/>
+        </p:spPr>
+        <p:txBody>
+          <a:bodyPr wrap="square" rtlCol="0">
+            <a:spAutoFit/>
+          </a:bodyPr>
+          <a:lstStyle/>
+          <a:p>
+            <a:r>
+              <a:rPr lang="en-US" dirty="0" smtClean="0">
+                <a:solidFill>
+                  <a:schemeClr val="accent5">
+                    <a:lumMod val="75000"/>
+                  </a:schemeClr>
+                </a:solidFill>
+              </a:rPr>
+              <a:t>*</a:t>
+            </a:r>
+            <a:endParaRPr lang="en-US" dirty="0">
+              <a:solidFill>
+                <a:schemeClr val="accent5">
+                  <a:lumMod val="75000"/>
+                </a:schemeClr>
+              </a:solidFill>
+            </a:endParaRPr>
+          </a:p>
+        </p:txBody>
+      </p:sp>
+      <p:sp>
+        <p:nvSpPr>
+          <p:cNvPr id="282" name="Flowchart: Decision 281"/>
+          <p:cNvSpPr/>
+          <p:nvPr/>
+        </p:nvSpPr>
+        <p:spPr>
+          <a:xfrm rot="5400000">
+            <a:off x="4038600" y="2121367"/>
+            <a:ext cx="152400" cy="152400"/>
+          </a:xfrm>
+          <a:prstGeom prst="flowChartDecision">
+            <a:avLst/>
+          </a:prstGeom>
+          <a:solidFill>
+            <a:schemeClr val="bg1"/>
+          </a:solidFill>
+        </p:spPr>
+        <p:style>
+          <a:lnRef idx="2">
+            <a:schemeClr val="accent5">
+              <a:shade val="50000"/>
+            </a:schemeClr>
+          </a:lnRef>
+          <a:fillRef idx="1">
+            <a:schemeClr val="accent5"/>
+          </a:fillRef>
+          <a:effectRef idx="0">
+            <a:schemeClr val="accent5"/>
+          </a:effectRef>
+          <a:fontRef idx="minor">
+            <a:schemeClr val="lt1"/>
+          </a:fontRef>
+        </p:style>
+        <p:txBody>
+          <a:bodyPr rtlCol="0" anchor="ctr"/>
+          <a:lstStyle/>
+          <a:p>
+            <a:pPr algn="ctr"/>
+            <a:endParaRPr lang="en-US"/>
+          </a:p>
+        </p:txBody>
+      </p:sp>
+      <p:cxnSp>
+        <p:nvCxnSpPr>
+          <p:cNvPr id="283" name="Elbow Connector 186"/>
+          <p:cNvCxnSpPr>
+            <a:stCxn id="282" idx="3"/>
+            <a:endCxn id="261" idx="1"/>
+          </p:cNvCxnSpPr>
+          <p:nvPr/>
+        </p:nvCxnSpPr>
+        <p:spPr>
+          <a:xfrm rot="16200000" flipH="1">
+            <a:off x="4135765" y="2252802"/>
+            <a:ext cx="262870" cy="304800"/>
+          </a:xfrm>
+          <a:prstGeom prst="bentConnector2">
+            <a:avLst/>
+          </a:prstGeom>
+          <a:ln>
+            <a:tailEnd type="arrow"/>
+          </a:ln>
+        </p:spPr>
+        <p:style>
+          <a:lnRef idx="2">
+            <a:schemeClr val="accent5">
+              <a:shade val="50000"/>
+            </a:schemeClr>
+          </a:lnRef>
+          <a:fillRef idx="1">
+            <a:schemeClr val="accent5"/>
+          </a:fillRef>
+          <a:effectRef idx="0">
+            <a:schemeClr val="accent5"/>
+          </a:effectRef>
+          <a:fontRef idx="minor">
+            <a:schemeClr val="lt1"/>
+          </a:fontRef>
+        </p:style>
+      </p:cxnSp>
+      <p:sp>
+        <p:nvSpPr>
+          <p:cNvPr id="284" name="TextBox 283"/>
+          <p:cNvSpPr txBox="1"/>
+          <p:nvPr/>
+        </p:nvSpPr>
+        <p:spPr>
+          <a:xfrm>
+            <a:off x="4150665" y="2273767"/>
+            <a:ext cx="228600" cy="369332"/>
+          </a:xfrm>
+          <a:prstGeom prst="rect">
+            <a:avLst/>
+          </a:prstGeom>
+          <a:noFill/>
+        </p:spPr>
+        <p:txBody>
+          <a:bodyPr wrap="square" rtlCol="0">
+            <a:spAutoFit/>
+          </a:bodyPr>
+          <a:lstStyle/>
+          <a:p>
+            <a:r>
+              <a:rPr lang="en-US" dirty="0" smtClean="0">
+                <a:solidFill>
+                  <a:schemeClr val="accent5">
+                    <a:lumMod val="75000"/>
+                  </a:schemeClr>
+                </a:solidFill>
+              </a:rPr>
+              <a:t>*</a:t>
+            </a:r>
+            <a:endParaRPr lang="en-US" dirty="0">
+              <a:solidFill>
+                <a:schemeClr val="accent5">
+                  <a:lumMod val="75000"/>
+                </a:schemeClr>
+              </a:solidFill>
+            </a:endParaRPr>
+          </a:p>
+        </p:txBody>
+      </p:sp>
+      <p:sp>
+        <p:nvSpPr>
+          <p:cNvPr id="285" name="Rectangle 284"/>
+          <p:cNvSpPr/>
+          <p:nvPr/>
+        </p:nvSpPr>
+        <p:spPr>
+          <a:xfrm>
+            <a:off x="4724400" y="2974317"/>
+            <a:ext cx="1550726" cy="361770"/>
+          </a:xfrm>
+          <a:prstGeom prst="rect">
+            <a:avLst/>
+          </a:prstGeom>
+        </p:spPr>
+        <p:style>
+          <a:lnRef idx="2">
+            <a:schemeClr val="accent6">
+              <a:shade val="50000"/>
+            </a:schemeClr>
+          </a:lnRef>
+          <a:fillRef idx="1">
+            <a:schemeClr val="accent6"/>
+          </a:fillRef>
+          <a:effectRef idx="0">
+            <a:schemeClr val="accent6"/>
+          </a:effectRef>
+          <a:fontRef idx="minor">
+            <a:schemeClr val="lt1"/>
+          </a:fontRef>
+        </p:style>
+        <p:txBody>
+          <a:bodyPr rtlCol="0" anchor="ctr"/>
+          <a:lstStyle/>
+          <a:p>
+            <a:pPr algn="ctr"/>
+            <a:r>
+              <a:rPr lang="en-US" sz="1600" b="1" dirty="0" err="1" smtClean="0"/>
+              <a:t>SubmissionData</a:t>
+            </a:r>
+            <a:endParaRPr lang="en-SG" sz="1600" b="1" dirty="0"/>
+          </a:p>
+        </p:txBody>
+      </p:sp>
+      <p:sp>
+        <p:nvSpPr>
+          <p:cNvPr id="286" name="Flowchart: Decision 285"/>
+          <p:cNvSpPr/>
+          <p:nvPr/>
+        </p:nvSpPr>
+        <p:spPr>
+          <a:xfrm rot="5400000">
+            <a:off x="4419600" y="2717522"/>
+            <a:ext cx="152400" cy="152400"/>
+          </a:xfrm>
+          <a:prstGeom prst="flowChartDecision">
+            <a:avLst/>
+          </a:prstGeom>
+          <a:solidFill>
+            <a:schemeClr val="bg1"/>
+          </a:solidFill>
+        </p:spPr>
+        <p:style>
+          <a:lnRef idx="2">
+            <a:schemeClr val="accent5">
+              <a:shade val="50000"/>
+            </a:schemeClr>
+          </a:lnRef>
+          <a:fillRef idx="1">
+            <a:schemeClr val="accent5"/>
+          </a:fillRef>
+          <a:effectRef idx="0">
+            <a:schemeClr val="accent5"/>
+          </a:effectRef>
+          <a:fontRef idx="minor">
+            <a:schemeClr val="lt1"/>
+          </a:fontRef>
+        </p:style>
+        <p:txBody>
+          <a:bodyPr rtlCol="0" anchor="ctr"/>
+          <a:lstStyle/>
+          <a:p>
+            <a:pPr algn="ctr"/>
+            <a:endParaRPr lang="en-US"/>
+          </a:p>
+        </p:txBody>
+      </p:sp>
+      <p:cxnSp>
+        <p:nvCxnSpPr>
+          <p:cNvPr id="287" name="Elbow Connector 186"/>
+          <p:cNvCxnSpPr>
+            <a:stCxn id="286" idx="3"/>
+            <a:endCxn id="285" idx="1"/>
+          </p:cNvCxnSpPr>
+          <p:nvPr/>
+        </p:nvCxnSpPr>
+        <p:spPr>
+          <a:xfrm rot="16200000" flipH="1">
+            <a:off x="4467460" y="2898262"/>
+            <a:ext cx="285280" cy="228600"/>
+          </a:xfrm>
+          <a:prstGeom prst="bentConnector2">
+            <a:avLst/>
+          </a:prstGeom>
+          <a:ln>
+            <a:tailEnd type="arrow"/>
+          </a:ln>
+        </p:spPr>
+        <p:style>
+          <a:lnRef idx="2">
+            <a:schemeClr val="accent5">
+              <a:shade val="50000"/>
+            </a:schemeClr>
+          </a:lnRef>
+          <a:fillRef idx="1">
+            <a:schemeClr val="accent5"/>
+          </a:fillRef>
+          <a:effectRef idx="0">
+            <a:schemeClr val="accent5"/>
+          </a:effectRef>
+          <a:fontRef idx="minor">
+            <a:schemeClr val="lt1"/>
+          </a:fontRef>
+        </p:style>
+      </p:cxnSp>
+      <p:sp>
+        <p:nvSpPr>
+          <p:cNvPr id="288" name="TextBox 287"/>
+          <p:cNvSpPr txBox="1"/>
+          <p:nvPr/>
+        </p:nvSpPr>
+        <p:spPr>
+          <a:xfrm>
+            <a:off x="4495805" y="2869922"/>
+            <a:ext cx="228600" cy="369332"/>
+          </a:xfrm>
+          <a:prstGeom prst="rect">
+            <a:avLst/>
+          </a:prstGeom>
+          <a:noFill/>
+        </p:spPr>
+        <p:txBody>
+          <a:bodyPr wrap="square" rtlCol="0">
+            <a:spAutoFit/>
+          </a:bodyPr>
+          <a:lstStyle/>
+          <a:p>
+            <a:r>
+              <a:rPr lang="en-US" dirty="0" smtClean="0">
+                <a:solidFill>
+                  <a:schemeClr val="accent5">
+                    <a:lumMod val="75000"/>
+                  </a:schemeClr>
+                </a:solidFill>
+              </a:rPr>
+              <a:t>*</a:t>
+            </a:r>
+            <a:endParaRPr lang="en-US" dirty="0">
+              <a:solidFill>
+                <a:schemeClr val="accent5">
+                  <a:lumMod val="75000"/>
+                </a:schemeClr>
+              </a:solidFill>
+            </a:endParaRPr>
+          </a:p>
+        </p:txBody>
+      </p:sp>
+      <p:sp>
+        <p:nvSpPr>
+          <p:cNvPr id="289" name="Rectangle 288"/>
+          <p:cNvSpPr/>
+          <p:nvPr/>
+        </p:nvSpPr>
+        <p:spPr>
+          <a:xfrm>
+            <a:off x="5943600" y="503237"/>
+            <a:ext cx="1550726" cy="361770"/>
+          </a:xfrm>
+          <a:prstGeom prst="rect">
+            <a:avLst/>
+          </a:prstGeom>
+        </p:spPr>
+        <p:style>
+          <a:lnRef idx="2">
+            <a:schemeClr val="accent6">
+              <a:shade val="50000"/>
+            </a:schemeClr>
+          </a:lnRef>
+          <a:fillRef idx="1">
+            <a:schemeClr val="accent6"/>
+          </a:fillRef>
+          <a:effectRef idx="0">
+            <a:schemeClr val="accent6"/>
+          </a:effectRef>
+          <a:fontRef idx="minor">
+            <a:schemeClr val="lt1"/>
+          </a:fontRef>
+        </p:style>
+        <p:txBody>
+          <a:bodyPr rtlCol="0" anchor="ctr"/>
+          <a:lstStyle/>
+          <a:p>
+            <a:pPr algn="ctr"/>
+            <a:r>
+              <a:rPr lang="en-US" sz="1600" b="1" dirty="0" err="1" smtClean="0"/>
+              <a:t>InstructorData</a:t>
+            </a:r>
+            <a:endParaRPr lang="en-SG" sz="1600" b="1" dirty="0"/>
+          </a:p>
+        </p:txBody>
+      </p:sp>
+      <p:sp>
+        <p:nvSpPr>
+          <p:cNvPr id="290" name="Rectangle 289"/>
+          <p:cNvSpPr/>
+          <p:nvPr/>
+        </p:nvSpPr>
+        <p:spPr>
+          <a:xfrm>
+            <a:off x="6396484" y="1117970"/>
+            <a:ext cx="1550726" cy="361770"/>
+          </a:xfrm>
+          <a:prstGeom prst="rect">
+            <a:avLst/>
+          </a:prstGeom>
+        </p:spPr>
+        <p:style>
+          <a:lnRef idx="2">
+            <a:schemeClr val="accent6">
+              <a:shade val="50000"/>
+            </a:schemeClr>
+          </a:lnRef>
+          <a:fillRef idx="1">
+            <a:schemeClr val="accent6"/>
+          </a:fillRef>
+          <a:effectRef idx="0">
+            <a:schemeClr val="accent6"/>
+          </a:effectRef>
+          <a:fontRef idx="minor">
+            <a:schemeClr val="lt1"/>
+          </a:fontRef>
+        </p:style>
+        <p:txBody>
+          <a:bodyPr rtlCol="0" anchor="ctr"/>
+          <a:lstStyle/>
+          <a:p>
+            <a:pPr algn="ctr"/>
+            <a:r>
+              <a:rPr lang="en-US" sz="1600" b="1" dirty="0" err="1" smtClean="0"/>
+              <a:t>CourseData</a:t>
+            </a:r>
+            <a:endParaRPr lang="en-SG" sz="1600" b="1" dirty="0"/>
+          </a:p>
+        </p:txBody>
+      </p:sp>
+      <p:sp>
+        <p:nvSpPr>
+          <p:cNvPr id="291" name="Flowchart: Decision 290"/>
+          <p:cNvSpPr/>
+          <p:nvPr/>
+        </p:nvSpPr>
+        <p:spPr>
+          <a:xfrm rot="5400000">
+            <a:off x="6096000" y="884238"/>
+            <a:ext cx="152400" cy="152400"/>
+          </a:xfrm>
+          <a:prstGeom prst="flowChartDecision">
+            <a:avLst/>
+          </a:prstGeom>
+          <a:solidFill>
+            <a:schemeClr val="bg1"/>
+          </a:solidFill>
+        </p:spPr>
+        <p:style>
+          <a:lnRef idx="2">
+            <a:schemeClr val="accent5">
+              <a:shade val="50000"/>
+            </a:schemeClr>
+          </a:lnRef>
+          <a:fillRef idx="1">
+            <a:schemeClr val="accent5"/>
+          </a:fillRef>
+          <a:effectRef idx="0">
+            <a:schemeClr val="accent5"/>
+          </a:effectRef>
+          <a:fontRef idx="minor">
+            <a:schemeClr val="lt1"/>
+          </a:fontRef>
+        </p:style>
+        <p:txBody>
+          <a:bodyPr rtlCol="0" anchor="ctr"/>
+          <a:lstStyle/>
+          <a:p>
+            <a:pPr algn="ctr"/>
+            <a:endParaRPr lang="en-US"/>
+          </a:p>
+        </p:txBody>
+      </p:sp>
+      <p:cxnSp>
+        <p:nvCxnSpPr>
+          <p:cNvPr id="292" name="Elbow Connector 190"/>
+          <p:cNvCxnSpPr>
+            <a:stCxn id="291" idx="3"/>
+            <a:endCxn id="290" idx="1"/>
+          </p:cNvCxnSpPr>
+          <p:nvPr/>
+        </p:nvCxnSpPr>
+        <p:spPr>
+          <a:xfrm rot="16200000" flipH="1">
+            <a:off x="6153234" y="1055604"/>
+            <a:ext cx="262217" cy="224284"/>
+          </a:xfrm>
+          <a:prstGeom prst="bentConnector2">
+            <a:avLst/>
+          </a:prstGeom>
+          <a:ln>
+            <a:tailEnd type="arrow"/>
+          </a:ln>
+        </p:spPr>
+        <p:style>
+          <a:lnRef idx="2">
+            <a:schemeClr val="accent5">
+              <a:shade val="50000"/>
+            </a:schemeClr>
+          </a:lnRef>
+          <a:fillRef idx="1">
+            <a:schemeClr val="accent5"/>
+          </a:fillRef>
+          <a:effectRef idx="0">
+            <a:schemeClr val="accent5"/>
+          </a:effectRef>
+          <a:fontRef idx="minor">
+            <a:schemeClr val="lt1"/>
+          </a:fontRef>
+        </p:style>
+      </p:cxnSp>
+      <p:sp>
+        <p:nvSpPr>
+          <p:cNvPr id="293" name="TextBox 292"/>
+          <p:cNvSpPr txBox="1"/>
+          <p:nvPr/>
+        </p:nvSpPr>
+        <p:spPr>
+          <a:xfrm>
+            <a:off x="6172200" y="1036637"/>
+            <a:ext cx="228600" cy="369332"/>
+          </a:xfrm>
+          <a:prstGeom prst="rect">
+            <a:avLst/>
+          </a:prstGeom>
+          <a:noFill/>
+        </p:spPr>
+        <p:txBody>
+          <a:bodyPr wrap="square" rtlCol="0">
+            <a:spAutoFit/>
+          </a:bodyPr>
+          <a:lstStyle/>
+          <a:p>
+            <a:r>
+              <a:rPr lang="en-US" dirty="0" smtClean="0">
+                <a:solidFill>
+                  <a:schemeClr val="accent5">
+                    <a:lumMod val="75000"/>
+                  </a:schemeClr>
+                </a:solidFill>
+              </a:rPr>
+              <a:t>*</a:t>
+            </a:r>
+            <a:endParaRPr lang="en-US" dirty="0">
+              <a:solidFill>
+                <a:schemeClr val="accent5">
+                  <a:lumMod val="75000"/>
+                </a:schemeClr>
+              </a:solidFill>
+            </a:endParaRPr>
+          </a:p>
+        </p:txBody>
+      </p:sp>
+      <p:sp>
+        <p:nvSpPr>
+          <p:cNvPr id="294" name="Rectangle 293"/>
+          <p:cNvSpPr/>
+          <p:nvPr/>
+        </p:nvSpPr>
+        <p:spPr>
+          <a:xfrm>
+            <a:off x="6781800" y="1798637"/>
+            <a:ext cx="1550726" cy="361770"/>
+          </a:xfrm>
+          <a:prstGeom prst="rect">
+            <a:avLst/>
+          </a:prstGeom>
+        </p:spPr>
+        <p:style>
+          <a:lnRef idx="2">
+            <a:schemeClr val="accent6">
+              <a:shade val="50000"/>
+            </a:schemeClr>
+          </a:lnRef>
+          <a:fillRef idx="1">
+            <a:schemeClr val="accent6"/>
+          </a:fillRef>
+          <a:effectRef idx="0">
+            <a:schemeClr val="accent6"/>
+          </a:effectRef>
+          <a:fontRef idx="minor">
+            <a:schemeClr val="lt1"/>
+          </a:fontRef>
+        </p:style>
+        <p:txBody>
+          <a:bodyPr rtlCol="0" anchor="ctr"/>
+          <a:lstStyle/>
+          <a:p>
+            <a:pPr algn="ctr"/>
+            <a:r>
+              <a:rPr lang="en-US" sz="1600" b="1" dirty="0" err="1" smtClean="0"/>
+              <a:t>EvaluationData</a:t>
+            </a:r>
+            <a:endParaRPr lang="en-SG" sz="1600" b="1" dirty="0"/>
+          </a:p>
+        </p:txBody>
+      </p:sp>
+      <p:sp>
+        <p:nvSpPr>
+          <p:cNvPr id="295" name="TextBox 294"/>
+          <p:cNvSpPr txBox="1"/>
+          <p:nvPr/>
+        </p:nvSpPr>
+        <p:spPr>
+          <a:xfrm>
+            <a:off x="6557516" y="1721923"/>
+            <a:ext cx="228600" cy="369332"/>
+          </a:xfrm>
+          <a:prstGeom prst="rect">
+            <a:avLst/>
+          </a:prstGeom>
+          <a:noFill/>
+        </p:spPr>
+        <p:txBody>
+          <a:bodyPr wrap="square" rtlCol="0">
+            <a:spAutoFit/>
+          </a:bodyPr>
+          <a:lstStyle/>
+          <a:p>
+            <a:r>
+              <a:rPr lang="en-US" dirty="0" smtClean="0">
+                <a:solidFill>
+                  <a:schemeClr val="accent5">
+                    <a:lumMod val="75000"/>
+                  </a:schemeClr>
+                </a:solidFill>
+              </a:rPr>
+              <a:t>*</a:t>
+            </a:r>
+            <a:endParaRPr lang="en-US" dirty="0">
+              <a:solidFill>
+                <a:schemeClr val="accent5">
+                  <a:lumMod val="75000"/>
+                </a:schemeClr>
+              </a:solidFill>
+            </a:endParaRPr>
+          </a:p>
+        </p:txBody>
+      </p:sp>
+      <p:sp>
+        <p:nvSpPr>
+          <p:cNvPr id="296" name="Flowchart: Decision 295"/>
+          <p:cNvSpPr/>
+          <p:nvPr/>
+        </p:nvSpPr>
+        <p:spPr>
+          <a:xfrm rot="5400000">
+            <a:off x="6477000" y="1493837"/>
+            <a:ext cx="152400" cy="152400"/>
+          </a:xfrm>
+          <a:prstGeom prst="flowChartDecision">
+            <a:avLst/>
+          </a:prstGeom>
+          <a:solidFill>
+            <a:schemeClr val="bg1"/>
+          </a:solidFill>
+        </p:spPr>
+        <p:style>
+          <a:lnRef idx="2">
+            <a:schemeClr val="accent5">
+              <a:shade val="50000"/>
+            </a:schemeClr>
+          </a:lnRef>
+          <a:fillRef idx="1">
+            <a:schemeClr val="accent5"/>
+          </a:fillRef>
+          <a:effectRef idx="0">
+            <a:schemeClr val="accent5"/>
+          </a:effectRef>
+          <a:fontRef idx="minor">
+            <a:schemeClr val="lt1"/>
+          </a:fontRef>
+        </p:style>
+        <p:txBody>
+          <a:bodyPr rtlCol="0" anchor="ctr"/>
+          <a:lstStyle/>
+          <a:p>
+            <a:pPr algn="ctr"/>
+            <a:endParaRPr lang="en-US"/>
+          </a:p>
+        </p:txBody>
+      </p:sp>
+      <p:cxnSp>
+        <p:nvCxnSpPr>
+          <p:cNvPr id="297" name="Elbow Connector 196"/>
+          <p:cNvCxnSpPr>
+            <a:stCxn id="296" idx="3"/>
+            <a:endCxn id="294" idx="1"/>
+          </p:cNvCxnSpPr>
+          <p:nvPr/>
+        </p:nvCxnSpPr>
+        <p:spPr>
+          <a:xfrm rot="16200000" flipH="1">
+            <a:off x="6500858" y="1698579"/>
+            <a:ext cx="333285" cy="228600"/>
+          </a:xfrm>
+          <a:prstGeom prst="bentConnector2">
+            <a:avLst/>
+          </a:prstGeom>
+          <a:ln>
+            <a:tailEnd type="arrow"/>
+          </a:ln>
+        </p:spPr>
+        <p:style>
+          <a:lnRef idx="2">
+            <a:schemeClr val="accent5">
+              <a:shade val="50000"/>
+            </a:schemeClr>
+          </a:lnRef>
+          <a:fillRef idx="1">
+            <a:schemeClr val="accent5"/>
+          </a:fillRef>
+          <a:effectRef idx="0">
+            <a:schemeClr val="accent5"/>
+          </a:effectRef>
+          <a:fontRef idx="minor">
+            <a:schemeClr val="lt1"/>
+          </a:fontRef>
+        </p:style>
+      </p:cxnSp>
+      <p:sp>
+        <p:nvSpPr>
+          <p:cNvPr id="298" name="Rectangle 297"/>
+          <p:cNvSpPr/>
+          <p:nvPr/>
+        </p:nvSpPr>
+        <p:spPr>
+          <a:xfrm>
+            <a:off x="6781806" y="2408237"/>
+            <a:ext cx="1524000" cy="361770"/>
+          </a:xfrm>
+          <a:prstGeom prst="rect">
+            <a:avLst/>
+          </a:prstGeom>
+        </p:spPr>
+        <p:style>
+          <a:lnRef idx="2">
+            <a:schemeClr val="accent5">
+              <a:shade val="50000"/>
+            </a:schemeClr>
+          </a:lnRef>
+          <a:fillRef idx="1">
+            <a:schemeClr val="accent5"/>
+          </a:fillRef>
+          <a:effectRef idx="0">
+            <a:schemeClr val="accent5"/>
+          </a:effectRef>
+          <a:fontRef idx="minor">
+            <a:schemeClr val="lt1"/>
+          </a:fontRef>
+        </p:style>
+        <p:txBody>
+          <a:bodyPr rtlCol="0" anchor="ctr"/>
+          <a:lstStyle/>
+          <a:p>
+            <a:pPr algn="ctr"/>
+            <a:r>
+              <a:rPr lang="en-US" sz="1600" b="1" dirty="0" err="1" smtClean="0"/>
+              <a:t>TeamData</a:t>
+            </a:r>
+            <a:endParaRPr lang="en-SG" sz="1600" b="1" dirty="0"/>
+          </a:p>
+        </p:txBody>
+      </p:sp>
+      <p:cxnSp>
+        <p:nvCxnSpPr>
+          <p:cNvPr id="299" name="Elbow Connector 186"/>
+          <p:cNvCxnSpPr>
+            <a:stCxn id="296" idx="3"/>
+            <a:endCxn id="298" idx="1"/>
+          </p:cNvCxnSpPr>
+          <p:nvPr/>
+        </p:nvCxnSpPr>
+        <p:spPr>
+          <a:xfrm rot="16200000" flipH="1">
+            <a:off x="6196061" y="2003376"/>
+            <a:ext cx="942885" cy="228606"/>
+          </a:xfrm>
+          <a:prstGeom prst="bentConnector2">
+            <a:avLst/>
+          </a:prstGeom>
+          <a:ln>
+            <a:tailEnd type="arrow"/>
+          </a:ln>
+        </p:spPr>
+        <p:style>
+          <a:lnRef idx="2">
+            <a:schemeClr val="accent5">
+              <a:shade val="50000"/>
+            </a:schemeClr>
+          </a:lnRef>
+          <a:fillRef idx="1">
+            <a:schemeClr val="accent5"/>
+          </a:fillRef>
+          <a:effectRef idx="0">
+            <a:schemeClr val="accent5"/>
+          </a:effectRef>
+          <a:fontRef idx="minor">
+            <a:schemeClr val="lt1"/>
+          </a:fontRef>
+        </p:style>
+      </p:cxnSp>
+      <p:sp>
+        <p:nvSpPr>
+          <p:cNvPr id="300" name="TextBox 299"/>
+          <p:cNvSpPr txBox="1"/>
+          <p:nvPr/>
+        </p:nvSpPr>
+        <p:spPr>
+          <a:xfrm>
+            <a:off x="6553206" y="2316810"/>
+            <a:ext cx="228600" cy="369332"/>
+          </a:xfrm>
+          <a:prstGeom prst="rect">
+            <a:avLst/>
+          </a:prstGeom>
+          <a:noFill/>
+        </p:spPr>
+        <p:txBody>
+          <a:bodyPr wrap="square" rtlCol="0">
+            <a:spAutoFit/>
+          </a:bodyPr>
+          <a:lstStyle/>
+          <a:p>
+            <a:r>
+              <a:rPr lang="en-US" dirty="0" smtClean="0">
+                <a:solidFill>
+                  <a:schemeClr val="accent5">
+                    <a:lumMod val="75000"/>
+                  </a:schemeClr>
+                </a:solidFill>
+              </a:rPr>
+              <a:t>*</a:t>
+            </a:r>
+            <a:endParaRPr lang="en-US" dirty="0">
+              <a:solidFill>
+                <a:schemeClr val="accent5">
+                  <a:lumMod val="75000"/>
+                </a:schemeClr>
+              </a:solidFill>
+            </a:endParaRPr>
+          </a:p>
+        </p:txBody>
+      </p:sp>
+      <p:sp>
+        <p:nvSpPr>
+          <p:cNvPr id="301" name="Rectangle 300"/>
+          <p:cNvSpPr/>
+          <p:nvPr/>
+        </p:nvSpPr>
+        <p:spPr>
+          <a:xfrm>
+            <a:off x="7162806" y="3046032"/>
+            <a:ext cx="1550726" cy="361770"/>
+          </a:xfrm>
+          <a:prstGeom prst="rect">
+            <a:avLst/>
+          </a:prstGeom>
+        </p:spPr>
+        <p:style>
+          <a:lnRef idx="2">
+            <a:schemeClr val="accent6">
+              <a:shade val="50000"/>
+            </a:schemeClr>
+          </a:lnRef>
+          <a:fillRef idx="1">
+            <a:schemeClr val="accent6"/>
+          </a:fillRef>
+          <a:effectRef idx="0">
+            <a:schemeClr val="accent6"/>
+          </a:effectRef>
+          <a:fontRef idx="minor">
+            <a:schemeClr val="lt1"/>
+          </a:fontRef>
+        </p:style>
+        <p:txBody>
+          <a:bodyPr rtlCol="0" anchor="ctr"/>
+          <a:lstStyle/>
+          <a:p>
+            <a:pPr algn="ctr"/>
+            <a:r>
+              <a:rPr lang="en-US" sz="1600" b="1" dirty="0" err="1" smtClean="0"/>
+              <a:t>StudentData</a:t>
+            </a:r>
+            <a:endParaRPr lang="en-SG" sz="1600" b="1" dirty="0"/>
+          </a:p>
+        </p:txBody>
+      </p:sp>
+      <p:sp>
+        <p:nvSpPr>
+          <p:cNvPr id="302" name="Flowchart: Decision 301"/>
+          <p:cNvSpPr/>
+          <p:nvPr/>
+        </p:nvSpPr>
+        <p:spPr>
+          <a:xfrm rot="5400000">
+            <a:off x="6858000" y="2789237"/>
+            <a:ext cx="152400" cy="152400"/>
+          </a:xfrm>
+          <a:prstGeom prst="flowChartDecision">
+            <a:avLst/>
+          </a:prstGeom>
+          <a:solidFill>
+            <a:schemeClr val="bg1"/>
+          </a:solidFill>
+        </p:spPr>
+        <p:style>
+          <a:lnRef idx="2">
+            <a:schemeClr val="accent5">
+              <a:shade val="50000"/>
+            </a:schemeClr>
+          </a:lnRef>
+          <a:fillRef idx="1">
+            <a:schemeClr val="accent5"/>
+          </a:fillRef>
+          <a:effectRef idx="0">
+            <a:schemeClr val="accent5"/>
+          </a:effectRef>
+          <a:fontRef idx="minor">
+            <a:schemeClr val="lt1"/>
+          </a:fontRef>
+        </p:style>
+        <p:txBody>
+          <a:bodyPr rtlCol="0" anchor="ctr"/>
+          <a:lstStyle/>
+          <a:p>
+            <a:pPr algn="ctr"/>
+            <a:endParaRPr lang="en-US"/>
+          </a:p>
+        </p:txBody>
+      </p:sp>
+      <p:cxnSp>
+        <p:nvCxnSpPr>
+          <p:cNvPr id="303" name="Elbow Connector 186"/>
+          <p:cNvCxnSpPr>
+            <a:stCxn id="302" idx="3"/>
+            <a:endCxn id="301" idx="1"/>
+          </p:cNvCxnSpPr>
+          <p:nvPr/>
+        </p:nvCxnSpPr>
+        <p:spPr>
+          <a:xfrm rot="16200000" flipH="1">
+            <a:off x="6905863" y="2969974"/>
+            <a:ext cx="285280" cy="228606"/>
+          </a:xfrm>
+          <a:prstGeom prst="bentConnector2">
+            <a:avLst/>
+          </a:prstGeom>
+          <a:ln>
+            <a:tailEnd type="arrow"/>
+          </a:ln>
+        </p:spPr>
+        <p:style>
+          <a:lnRef idx="2">
+            <a:schemeClr val="accent5">
+              <a:shade val="50000"/>
+            </a:schemeClr>
+          </a:lnRef>
+          <a:fillRef idx="1">
+            <a:schemeClr val="accent5"/>
+          </a:fillRef>
+          <a:effectRef idx="0">
+            <a:schemeClr val="accent5"/>
+          </a:effectRef>
+          <a:fontRef idx="minor">
+            <a:schemeClr val="lt1"/>
+          </a:fontRef>
+        </p:style>
+      </p:cxnSp>
+      <p:sp>
+        <p:nvSpPr>
+          <p:cNvPr id="304" name="TextBox 303"/>
+          <p:cNvSpPr txBox="1"/>
+          <p:nvPr/>
+        </p:nvSpPr>
+        <p:spPr>
+          <a:xfrm>
+            <a:off x="6934205" y="2941637"/>
+            <a:ext cx="228600" cy="369332"/>
+          </a:xfrm>
+          <a:prstGeom prst="rect">
+            <a:avLst/>
+          </a:prstGeom>
+          <a:noFill/>
+        </p:spPr>
+        <p:txBody>
+          <a:bodyPr wrap="square" rtlCol="0">
+            <a:spAutoFit/>
+          </a:bodyPr>
+          <a:lstStyle/>
+          <a:p>
+            <a:r>
+              <a:rPr lang="en-US" dirty="0" smtClean="0">
+                <a:solidFill>
+                  <a:schemeClr val="accent5">
+                    <a:lumMod val="75000"/>
+                  </a:schemeClr>
+                </a:solidFill>
+              </a:rPr>
+              <a:t>*</a:t>
+            </a:r>
+            <a:endParaRPr lang="en-US" dirty="0">
+              <a:solidFill>
+                <a:schemeClr val="accent5">
+                  <a:lumMod val="75000"/>
+                </a:schemeClr>
+              </a:solidFill>
+            </a:endParaRPr>
+          </a:p>
+        </p:txBody>
+      </p:sp>
+      <p:sp>
+        <p:nvSpPr>
+          <p:cNvPr id="305" name="TextBox 304"/>
+          <p:cNvSpPr txBox="1"/>
+          <p:nvPr/>
+        </p:nvSpPr>
+        <p:spPr>
+          <a:xfrm>
+            <a:off x="914400" y="46037"/>
+            <a:ext cx="533400" cy="369332"/>
+          </a:xfrm>
+          <a:prstGeom prst="rect">
+            <a:avLst/>
+          </a:prstGeom>
+          <a:noFill/>
+        </p:spPr>
+        <p:txBody>
+          <a:bodyPr wrap="square" rtlCol="0">
+            <a:spAutoFit/>
+          </a:bodyPr>
+          <a:lstStyle/>
+          <a:p>
+            <a:r>
+              <a:rPr lang="en-US" dirty="0" smtClean="0"/>
+              <a:t>(a)</a:t>
+            </a:r>
+            <a:endParaRPr lang="en-US" dirty="0"/>
+          </a:p>
+        </p:txBody>
+      </p:sp>
+      <p:sp>
+        <p:nvSpPr>
+          <p:cNvPr id="306" name="TextBox 305"/>
+          <p:cNvSpPr txBox="1"/>
+          <p:nvPr/>
+        </p:nvSpPr>
+        <p:spPr>
+          <a:xfrm>
+            <a:off x="3429000" y="57705"/>
+            <a:ext cx="533400" cy="369332"/>
+          </a:xfrm>
+          <a:prstGeom prst="rect">
+            <a:avLst/>
+          </a:prstGeom>
+          <a:noFill/>
+        </p:spPr>
+        <p:txBody>
+          <a:bodyPr wrap="square" rtlCol="0">
+            <a:spAutoFit/>
+          </a:bodyPr>
+          <a:lstStyle/>
+          <a:p>
+            <a:r>
+              <a:rPr lang="en-US" dirty="0" smtClean="0"/>
+              <a:t>(b)</a:t>
+            </a:r>
+            <a:endParaRPr lang="en-US" dirty="0"/>
+          </a:p>
+        </p:txBody>
+      </p:sp>
+      <p:sp>
+        <p:nvSpPr>
+          <p:cNvPr id="307" name="TextBox 306"/>
+          <p:cNvSpPr txBox="1"/>
+          <p:nvPr/>
+        </p:nvSpPr>
+        <p:spPr>
+          <a:xfrm>
+            <a:off x="6324600" y="46037"/>
+            <a:ext cx="533400" cy="369332"/>
+          </a:xfrm>
+          <a:prstGeom prst="rect">
+            <a:avLst/>
+          </a:prstGeom>
+          <a:noFill/>
+        </p:spPr>
+        <p:txBody>
+          <a:bodyPr wrap="square" rtlCol="0">
+            <a:spAutoFit/>
+          </a:bodyPr>
+          <a:lstStyle/>
+          <a:p>
+            <a:r>
+              <a:rPr lang="en-US" dirty="0" smtClean="0"/>
+              <a:t>(c)</a:t>
+            </a:r>
+            <a:endParaRPr lang="en-US" dirty="0"/>
           </a:p>
         </p:txBody>
       </p:sp>

</xml_diff>